<commit_message>
working on powerpoint right nowwwwww
</commit_message>
<xml_diff>
--- a/Doge_presentation.pptx
+++ b/Doge_presentation.pptx
@@ -6,6 +6,14 @@
   </p:sldMasterIdLst>
   <p:sldIdLst>
     <p:sldId id="256" r:id="rId2"/>
+    <p:sldId id="257" r:id="rId3"/>
+    <p:sldId id="258" r:id="rId4"/>
+    <p:sldId id="259" r:id="rId5"/>
+    <p:sldId id="260" r:id="rId6"/>
+    <p:sldId id="261" r:id="rId7"/>
+    <p:sldId id="264" r:id="rId8"/>
+    <p:sldId id="263" r:id="rId9"/>
+    <p:sldId id="262" r:id="rId10"/>
   </p:sldIdLst>
   <p:sldSz cx="9144000" cy="6858000" type="screen4x3"/>
   <p:notesSz cx="6858000" cy="9144000"/>
@@ -299,7 +307,8 @@
           <a:p>
             <a:fld id="{216C5678-EE20-4FA5-88E2-6E0BD67A2E26}" type="datetime1">
               <a:rPr lang="en-US" smtClean="0"/>
-              <a:t>5/2/14</a:t>
+              <a:pPr/>
+              <a:t>5/2/2014</a:t>
             </a:fld>
             <a:endParaRPr lang="en-US" dirty="0"/>
           </a:p>
@@ -469,7 +478,8 @@
           <a:p>
             <a:fld id="{EA051B39-B140-43FE-96DB-472A2B59CE7C}" type="datetime1">
               <a:rPr lang="en-US" smtClean="0"/>
-              <a:t>5/2/14</a:t>
+              <a:pPr/>
+              <a:t>5/2/2014</a:t>
             </a:fld>
             <a:endParaRPr lang="en-US"/>
           </a:p>
@@ -649,7 +659,8 @@
           <a:p>
             <a:fld id="{DA600BB2-27C5-458B-ABCE-839C88CF47CE}" type="datetime1">
               <a:rPr lang="en-US" smtClean="0"/>
-              <a:t>5/2/14</a:t>
+              <a:pPr/>
+              <a:t>5/2/2014</a:t>
             </a:fld>
             <a:endParaRPr lang="en-US"/>
           </a:p>
@@ -837,7 +848,8 @@
           <a:p>
             <a:fld id="{B11D738E-8962-435F-8C43-147B8DD7E819}" type="datetime1">
               <a:rPr lang="en-US" smtClean="0"/>
-              <a:t>5/2/14</a:t>
+              <a:pPr/>
+              <a:t>5/2/2014</a:t>
             </a:fld>
             <a:endParaRPr lang="en-US"/>
           </a:p>
@@ -1104,7 +1116,8 @@
           <a:p>
             <a:fld id="{09CAEA93-55E7-4DA9-90C2-089A26EEFEC4}" type="datetime1">
               <a:rPr lang="en-US" smtClean="0"/>
-              <a:t>5/2/14</a:t>
+              <a:pPr/>
+              <a:t>5/2/2014</a:t>
             </a:fld>
             <a:endParaRPr lang="en-US"/>
           </a:p>
@@ -1457,7 +1470,8 @@
           <a:p>
             <a:fld id="{E34CF3C7-6809-4F39-BD67-A75817BDDE0A}" type="datetime1">
               <a:rPr lang="en-US" smtClean="0"/>
-              <a:t>5/2/14</a:t>
+              <a:pPr/>
+              <a:t>5/2/2014</a:t>
             </a:fld>
             <a:endParaRPr lang="en-US"/>
           </a:p>
@@ -1770,7 +1784,8 @@
           <a:p>
             <a:fld id="{F7EAEB24-CE78-465C-A726-91D0868FA48F}" type="datetime1">
               <a:rPr lang="en-US" smtClean="0"/>
-              <a:t>5/2/14</a:t>
+              <a:pPr/>
+              <a:t>5/2/2014</a:t>
             </a:fld>
             <a:endParaRPr lang="en-US"/>
           </a:p>
@@ -2002,7 +2017,8 @@
           <a:p>
             <a:fld id="{40BAADF0-1749-4E8B-9691-B44A5F8C0895}" type="datetime1">
               <a:rPr lang="en-US" smtClean="0"/>
-              <a:t>5/2/14</a:t>
+              <a:pPr/>
+              <a:t>5/2/2014</a:t>
             </a:fld>
             <a:endParaRPr lang="en-US"/>
           </a:p>
@@ -2097,7 +2113,8 @@
           <a:p>
             <a:fld id="{A8AF628A-A867-4937-BBE5-207DB6F9C51A}" type="datetime1">
               <a:rPr lang="en-US" smtClean="0"/>
-              <a:t>5/2/14</a:t>
+              <a:pPr/>
+              <a:t>5/2/2014</a:t>
             </a:fld>
             <a:endParaRPr lang="en-US"/>
           </a:p>
@@ -2390,7 +2407,8 @@
           <a:p>
             <a:fld id="{118BBB94-68E6-4675-A946-F1C5994EDBD7}" type="datetime1">
               <a:rPr lang="en-US" smtClean="0"/>
-              <a:t>5/2/14</a:t>
+              <a:pPr/>
+              <a:t>5/2/2014</a:t>
             </a:fld>
             <a:endParaRPr lang="en-US"/>
           </a:p>
@@ -2664,7 +2682,8 @@
           <a:p>
             <a:fld id="{DC3B8377-21E3-4835-B75D-4E2847E2750F}" type="datetime1">
               <a:rPr lang="en-US" smtClean="0"/>
-              <a:t>5/2/14</a:t>
+              <a:pPr/>
+              <a:t>5/2/2014</a:t>
             </a:fld>
             <a:endParaRPr lang="en-US"/>
           </a:p>
@@ -2879,7 +2898,8 @@
           <a:p>
             <a:fld id="{B0C4986D-6BE9-4264-908F-02DB36FD8D6C}" type="datetime1">
               <a:rPr lang="en-US" smtClean="0"/>
-              <a:t>5/2/14</a:t>
+              <a:pPr/>
+              <a:t>5/2/2014</a:t>
             </a:fld>
             <a:endParaRPr lang="en-US" dirty="0"/>
           </a:p>
@@ -3444,7 +3464,6 @@
               <a:rPr lang="en-US"/>
               <a:t>Part of Speech Tagging using the hidden Model</a:t>
             </a:r>
-            <a:endParaRPr lang="en-US"/>
           </a:p>
         </p:txBody>
       </p:sp>
@@ -3457,7 +3476,7 @@
           <p:nvPr/>
         </p:nvPicPr>
         <p:blipFill>
-          <a:blip r:embed="rId2"/>
+          <a:blip r:embed="rId2" cstate="print"/>
           <a:stretch>
             <a:fillRect/>
           </a:stretch>
@@ -3475,13 +3494,2901 @@
     </p:spTree>
     <p:extLst>
       <p:ext uri="{BB962C8B-B14F-4D97-AF65-F5344CB8AC3E}">
-        <p14:creationId xmlns:p14="http://schemas.microsoft.com/office/powerpoint/2010/main" val="3041979786"/>
+        <p14:creationId xmlns:p14="http://schemas.microsoft.com/office/powerpoint/2010/main" xmlns="" val="3041979786"/>
       </p:ext>
     </p:extLst>
   </p:cSld>
   <p:clrMapOvr>
     <a:masterClrMapping/>
   </p:clrMapOvr>
+</p:sld>
+</file>
+
+<file path=ppt/slides/slide2.xml><?xml version="1.0" encoding="utf-8"?>
+<p:sld xmlns:a="http://schemas.openxmlformats.org/drawingml/2006/main" xmlns:r="http://schemas.openxmlformats.org/officeDocument/2006/relationships" xmlns:p="http://schemas.openxmlformats.org/presentationml/2006/main">
+  <p:cSld>
+    <p:spTree>
+      <p:nvGrpSpPr>
+        <p:cNvPr id="1" name=""/>
+        <p:cNvGrpSpPr/>
+        <p:nvPr/>
+      </p:nvGrpSpPr>
+      <p:grpSpPr>
+        <a:xfrm>
+          <a:off x="0" y="0"/>
+          <a:ext cx="0" cy="0"/>
+          <a:chOff x="0" y="0"/>
+          <a:chExt cx="0" cy="0"/>
+        </a:xfrm>
+      </p:grpSpPr>
+      <p:sp>
+        <p:nvSpPr>
+          <p:cNvPr id="2" name="Title 1"/>
+          <p:cNvSpPr>
+            <a:spLocks noGrp="1"/>
+          </p:cNvSpPr>
+          <p:nvPr>
+            <p:ph type="title"/>
+          </p:nvPr>
+        </p:nvSpPr>
+        <p:spPr/>
+        <p:txBody>
+          <a:bodyPr/>
+          <a:lstStyle/>
+          <a:p>
+            <a:r>
+              <a:rPr lang="en-US" dirty="0" smtClean="0"/>
+              <a:t>Objective</a:t>
+            </a:r>
+            <a:endParaRPr lang="en-US" dirty="0"/>
+          </a:p>
+        </p:txBody>
+      </p:sp>
+      <p:sp>
+        <p:nvSpPr>
+          <p:cNvPr id="3" name="Content Placeholder 2"/>
+          <p:cNvSpPr>
+            <a:spLocks noGrp="1"/>
+          </p:cNvSpPr>
+          <p:nvPr>
+            <p:ph idx="1"/>
+          </p:nvPr>
+        </p:nvSpPr>
+        <p:spPr/>
+        <p:txBody>
+          <a:bodyPr/>
+          <a:lstStyle/>
+          <a:p>
+            <a:r>
+              <a:rPr lang="en-US" dirty="0" smtClean="0"/>
+              <a:t>Part of Speech tagging</a:t>
+            </a:r>
+          </a:p>
+          <a:p>
+            <a:r>
+              <a:rPr lang="en-US" dirty="0" smtClean="0"/>
+              <a:t>Input sentences into a program, whereupon each word in the sentences is assigned a part of speech</a:t>
+            </a:r>
+          </a:p>
+          <a:p>
+            <a:endParaRPr lang="en-US" dirty="0"/>
+          </a:p>
+        </p:txBody>
+      </p:sp>
+      <p:sp>
+        <p:nvSpPr>
+          <p:cNvPr id="5" name="TextBox 4"/>
+          <p:cNvSpPr txBox="1"/>
+          <p:nvPr/>
+        </p:nvSpPr>
+        <p:spPr>
+          <a:xfrm>
+            <a:off x="457200" y="3168713"/>
+            <a:ext cx="8419724" cy="1200329"/>
+          </a:xfrm>
+          <a:prstGeom prst="rect">
+            <a:avLst/>
+          </a:prstGeom>
+          <a:noFill/>
+        </p:spPr>
+        <p:txBody>
+          <a:bodyPr wrap="square" rtlCol="0">
+            <a:spAutoFit/>
+          </a:bodyPr>
+          <a:lstStyle/>
+          <a:p>
+            <a:pPr algn="ctr"/>
+            <a:r>
+              <a:rPr lang="en-US" sz="3600" dirty="0" smtClean="0">
+                <a:latin typeface="+mj-lt"/>
+              </a:rPr>
+              <a:t>The cow jumped over the moon.</a:t>
+            </a:r>
+          </a:p>
+          <a:p>
+            <a:pPr algn="ctr"/>
+            <a:endParaRPr lang="en-US" sz="3600" dirty="0">
+              <a:latin typeface="+mj-lt"/>
+            </a:endParaRPr>
+          </a:p>
+        </p:txBody>
+      </p:sp>
+      <p:sp>
+        <p:nvSpPr>
+          <p:cNvPr id="6" name="TextBox 5"/>
+          <p:cNvSpPr txBox="1"/>
+          <p:nvPr/>
+        </p:nvSpPr>
+        <p:spPr>
+          <a:xfrm>
+            <a:off x="1167902" y="3708331"/>
+            <a:ext cx="466794" cy="369332"/>
+          </a:xfrm>
+          <a:prstGeom prst="rect">
+            <a:avLst/>
+          </a:prstGeom>
+          <a:noFill/>
+        </p:spPr>
+        <p:txBody>
+          <a:bodyPr wrap="none" rtlCol="0">
+            <a:spAutoFit/>
+          </a:bodyPr>
+          <a:lstStyle/>
+          <a:p>
+            <a:r>
+              <a:rPr lang="en-US" dirty="0" smtClean="0">
+                <a:solidFill>
+                  <a:srgbClr val="FF0000"/>
+                </a:solidFill>
+              </a:rPr>
+              <a:t>art</a:t>
+            </a:r>
+            <a:endParaRPr lang="en-US" dirty="0">
+              <a:solidFill>
+                <a:srgbClr val="FF0000"/>
+              </a:solidFill>
+            </a:endParaRPr>
+          </a:p>
+        </p:txBody>
+      </p:sp>
+      <p:sp>
+        <p:nvSpPr>
+          <p:cNvPr id="7" name="TextBox 6"/>
+          <p:cNvSpPr txBox="1"/>
+          <p:nvPr/>
+        </p:nvSpPr>
+        <p:spPr>
+          <a:xfrm>
+            <a:off x="2118511" y="3717378"/>
+            <a:ext cx="720069" cy="369332"/>
+          </a:xfrm>
+          <a:prstGeom prst="rect">
+            <a:avLst/>
+          </a:prstGeom>
+          <a:noFill/>
+        </p:spPr>
+        <p:txBody>
+          <a:bodyPr wrap="none" rtlCol="0">
+            <a:spAutoFit/>
+          </a:bodyPr>
+          <a:lstStyle/>
+          <a:p>
+            <a:r>
+              <a:rPr lang="en-US" dirty="0" smtClean="0">
+                <a:solidFill>
+                  <a:srgbClr val="FF0000"/>
+                </a:solidFill>
+              </a:rPr>
+              <a:t>noun</a:t>
+            </a:r>
+            <a:endParaRPr lang="en-US" dirty="0">
+              <a:solidFill>
+                <a:srgbClr val="FF0000"/>
+              </a:solidFill>
+            </a:endParaRPr>
+          </a:p>
+        </p:txBody>
+      </p:sp>
+      <p:sp>
+        <p:nvSpPr>
+          <p:cNvPr id="8" name="TextBox 7"/>
+          <p:cNvSpPr txBox="1"/>
+          <p:nvPr/>
+        </p:nvSpPr>
+        <p:spPr>
+          <a:xfrm>
+            <a:off x="7209258" y="3717378"/>
+            <a:ext cx="720069" cy="369332"/>
+          </a:xfrm>
+          <a:prstGeom prst="rect">
+            <a:avLst/>
+          </a:prstGeom>
+          <a:noFill/>
+        </p:spPr>
+        <p:txBody>
+          <a:bodyPr wrap="none" rtlCol="0">
+            <a:spAutoFit/>
+          </a:bodyPr>
+          <a:lstStyle/>
+          <a:p>
+            <a:r>
+              <a:rPr lang="en-US" dirty="0" smtClean="0">
+                <a:solidFill>
+                  <a:srgbClr val="FF0000"/>
+                </a:solidFill>
+              </a:rPr>
+              <a:t>noun</a:t>
+            </a:r>
+            <a:endParaRPr lang="en-US" dirty="0">
+              <a:solidFill>
+                <a:srgbClr val="FF0000"/>
+              </a:solidFill>
+            </a:endParaRPr>
+          </a:p>
+        </p:txBody>
+      </p:sp>
+      <p:sp>
+        <p:nvSpPr>
+          <p:cNvPr id="9" name="TextBox 8"/>
+          <p:cNvSpPr txBox="1"/>
+          <p:nvPr/>
+        </p:nvSpPr>
+        <p:spPr>
+          <a:xfrm>
+            <a:off x="6005147" y="3717378"/>
+            <a:ext cx="466794" cy="646331"/>
+          </a:xfrm>
+          <a:prstGeom prst="rect">
+            <a:avLst/>
+          </a:prstGeom>
+          <a:noFill/>
+        </p:spPr>
+        <p:txBody>
+          <a:bodyPr wrap="none" rtlCol="0">
+            <a:spAutoFit/>
+          </a:bodyPr>
+          <a:lstStyle/>
+          <a:p>
+            <a:r>
+              <a:rPr lang="en-US" dirty="0" smtClean="0">
+                <a:solidFill>
+                  <a:srgbClr val="FF0000"/>
+                </a:solidFill>
+              </a:rPr>
+              <a:t>art</a:t>
+            </a:r>
+          </a:p>
+          <a:p>
+            <a:endParaRPr lang="en-US" dirty="0">
+              <a:solidFill>
+                <a:srgbClr val="FF0000"/>
+              </a:solidFill>
+            </a:endParaRPr>
+          </a:p>
+        </p:txBody>
+      </p:sp>
+      <p:sp>
+        <p:nvSpPr>
+          <p:cNvPr id="10" name="TextBox 9"/>
+          <p:cNvSpPr txBox="1"/>
+          <p:nvPr/>
+        </p:nvSpPr>
+        <p:spPr>
+          <a:xfrm>
+            <a:off x="4991159" y="3717378"/>
+            <a:ext cx="665567" cy="369332"/>
+          </a:xfrm>
+          <a:prstGeom prst="rect">
+            <a:avLst/>
+          </a:prstGeom>
+          <a:noFill/>
+        </p:spPr>
+        <p:txBody>
+          <a:bodyPr wrap="none" rtlCol="0">
+            <a:spAutoFit/>
+          </a:bodyPr>
+          <a:lstStyle/>
+          <a:p>
+            <a:r>
+              <a:rPr lang="en-US" dirty="0" smtClean="0">
+                <a:solidFill>
+                  <a:srgbClr val="FF0000"/>
+                </a:solidFill>
+              </a:rPr>
+              <a:t>prep</a:t>
+            </a:r>
+            <a:endParaRPr lang="en-US" dirty="0">
+              <a:solidFill>
+                <a:srgbClr val="FF0000"/>
+              </a:solidFill>
+            </a:endParaRPr>
+          </a:p>
+        </p:txBody>
+      </p:sp>
+      <p:sp>
+        <p:nvSpPr>
+          <p:cNvPr id="11" name="TextBox 10"/>
+          <p:cNvSpPr txBox="1"/>
+          <p:nvPr/>
+        </p:nvSpPr>
+        <p:spPr>
+          <a:xfrm>
+            <a:off x="3611142" y="3717378"/>
+            <a:ext cx="640753" cy="369332"/>
+          </a:xfrm>
+          <a:prstGeom prst="rect">
+            <a:avLst/>
+          </a:prstGeom>
+          <a:noFill/>
+        </p:spPr>
+        <p:txBody>
+          <a:bodyPr wrap="none" rtlCol="0">
+            <a:spAutoFit/>
+          </a:bodyPr>
+          <a:lstStyle/>
+          <a:p>
+            <a:r>
+              <a:rPr lang="en-US" dirty="0" smtClean="0">
+                <a:solidFill>
+                  <a:srgbClr val="FF0000"/>
+                </a:solidFill>
+              </a:rPr>
+              <a:t>verb</a:t>
+            </a:r>
+            <a:endParaRPr lang="en-US" dirty="0">
+              <a:solidFill>
+                <a:srgbClr val="FF0000"/>
+              </a:solidFill>
+            </a:endParaRPr>
+          </a:p>
+        </p:txBody>
+      </p:sp>
+    </p:spTree>
+  </p:cSld>
+  <p:clrMapOvr>
+    <a:masterClrMapping/>
+  </p:clrMapOvr>
+</p:sld>
+</file>
+
+<file path=ppt/slides/slide3.xml><?xml version="1.0" encoding="utf-8"?>
+<p:sld xmlns:a="http://schemas.openxmlformats.org/drawingml/2006/main" xmlns:r="http://schemas.openxmlformats.org/officeDocument/2006/relationships" xmlns:p="http://schemas.openxmlformats.org/presentationml/2006/main">
+  <p:cSld>
+    <p:spTree>
+      <p:nvGrpSpPr>
+        <p:cNvPr id="1" name=""/>
+        <p:cNvGrpSpPr/>
+        <p:nvPr/>
+      </p:nvGrpSpPr>
+      <p:grpSpPr>
+        <a:xfrm>
+          <a:off x="0" y="0"/>
+          <a:ext cx="0" cy="0"/>
+          <a:chOff x="0" y="0"/>
+          <a:chExt cx="0" cy="0"/>
+        </a:xfrm>
+      </p:grpSpPr>
+      <p:sp>
+        <p:nvSpPr>
+          <p:cNvPr id="2" name="Title 1"/>
+          <p:cNvSpPr>
+            <a:spLocks noGrp="1"/>
+          </p:cNvSpPr>
+          <p:nvPr>
+            <p:ph type="title"/>
+          </p:nvPr>
+        </p:nvSpPr>
+        <p:spPr/>
+        <p:txBody>
+          <a:bodyPr/>
+          <a:lstStyle/>
+          <a:p>
+            <a:r>
+              <a:rPr lang="en-US" dirty="0" smtClean="0"/>
+              <a:t>Markov Model</a:t>
+            </a:r>
+            <a:endParaRPr lang="en-US" dirty="0"/>
+          </a:p>
+        </p:txBody>
+      </p:sp>
+      <p:cxnSp>
+        <p:nvCxnSpPr>
+          <p:cNvPr id="26" name="Straight Arrow Connector 25"/>
+          <p:cNvCxnSpPr/>
+          <p:nvPr/>
+        </p:nvCxnSpPr>
+        <p:spPr>
+          <a:xfrm>
+            <a:off x="2602581" y="4512831"/>
+            <a:ext cx="4190246" cy="0"/>
+          </a:xfrm>
+          <a:prstGeom prst="straightConnector1">
+            <a:avLst/>
+          </a:prstGeom>
+          <a:ln>
+            <a:tailEnd type="arrow"/>
+          </a:ln>
+        </p:spPr>
+        <p:style>
+          <a:lnRef idx="1">
+            <a:schemeClr val="accent1"/>
+          </a:lnRef>
+          <a:fillRef idx="0">
+            <a:schemeClr val="accent1"/>
+          </a:fillRef>
+          <a:effectRef idx="0">
+            <a:schemeClr val="accent1"/>
+          </a:effectRef>
+          <a:fontRef idx="minor">
+            <a:schemeClr val="tx1"/>
+          </a:fontRef>
+        </p:style>
+      </p:cxnSp>
+      <p:cxnSp>
+        <p:nvCxnSpPr>
+          <p:cNvPr id="51" name="Elbow Connector 50"/>
+          <p:cNvCxnSpPr>
+            <a:endCxn id="5" idx="1"/>
+          </p:cNvCxnSpPr>
+          <p:nvPr/>
+        </p:nvCxnSpPr>
+        <p:spPr>
+          <a:xfrm rot="16200000" flipV="1">
+            <a:off x="1582743" y="4344520"/>
+            <a:ext cx="258327" cy="47450"/>
+          </a:xfrm>
+          <a:prstGeom prst="bentConnector4">
+            <a:avLst>
+              <a:gd name="adj1" fmla="val 294464"/>
+              <a:gd name="adj2" fmla="val 581770"/>
+            </a:avLst>
+          </a:prstGeom>
+          <a:ln>
+            <a:tailEnd type="arrow"/>
+          </a:ln>
+        </p:spPr>
+        <p:style>
+          <a:lnRef idx="1">
+            <a:schemeClr val="accent1"/>
+          </a:lnRef>
+          <a:fillRef idx="0">
+            <a:schemeClr val="accent1"/>
+          </a:fillRef>
+          <a:effectRef idx="0">
+            <a:schemeClr val="accent1"/>
+          </a:effectRef>
+          <a:fontRef idx="minor">
+            <a:schemeClr val="tx1"/>
+          </a:fontRef>
+        </p:style>
+      </p:cxnSp>
+      <p:grpSp>
+        <p:nvGrpSpPr>
+          <p:cNvPr id="75" name="Group 74"/>
+          <p:cNvGrpSpPr/>
+          <p:nvPr/>
+        </p:nvGrpSpPr>
+        <p:grpSpPr>
+          <a:xfrm>
+            <a:off x="892065" y="1999996"/>
+            <a:ext cx="7676750" cy="3058216"/>
+            <a:chOff x="865194" y="1600200"/>
+            <a:chExt cx="7676750" cy="2680229"/>
+          </a:xfrm>
+        </p:grpSpPr>
+        <p:sp>
+          <p:nvSpPr>
+            <p:cNvPr id="4" name="Oval 3"/>
+            <p:cNvSpPr/>
+            <p:nvPr/>
+          </p:nvSpPr>
+          <p:spPr>
+            <a:xfrm>
+              <a:off x="3951837" y="1600200"/>
+              <a:ext cx="1253905" cy="651849"/>
+            </a:xfrm>
+            <a:prstGeom prst="ellipse">
+              <a:avLst/>
+            </a:prstGeom>
+          </p:spPr>
+          <p:style>
+            <a:lnRef idx="2">
+              <a:schemeClr val="accent1">
+                <a:shade val="50000"/>
+              </a:schemeClr>
+            </a:lnRef>
+            <a:fillRef idx="1">
+              <a:schemeClr val="accent1"/>
+            </a:fillRef>
+            <a:effectRef idx="0">
+              <a:schemeClr val="accent1"/>
+            </a:effectRef>
+            <a:fontRef idx="minor">
+              <a:schemeClr val="lt1"/>
+            </a:fontRef>
+          </p:style>
+          <p:txBody>
+            <a:bodyPr rtlCol="0" anchor="ctr"/>
+            <a:lstStyle/>
+            <a:p>
+              <a:pPr algn="ctr"/>
+              <a:r>
+                <a:rPr lang="en-US" dirty="0" smtClean="0"/>
+                <a:t>Start</a:t>
+              </a:r>
+              <a:endParaRPr lang="en-US" dirty="0"/>
+            </a:p>
+          </p:txBody>
+        </p:sp>
+        <p:sp>
+          <p:nvSpPr>
+            <p:cNvPr id="5" name="Rectangle 4"/>
+            <p:cNvSpPr/>
+            <p:nvPr/>
+          </p:nvSpPr>
+          <p:spPr>
+            <a:xfrm>
+              <a:off x="1661310" y="3322623"/>
+              <a:ext cx="914400" cy="479833"/>
+            </a:xfrm>
+            <a:prstGeom prst="rect">
+              <a:avLst/>
+            </a:prstGeom>
+          </p:spPr>
+          <p:style>
+            <a:lnRef idx="2">
+              <a:schemeClr val="accent1">
+                <a:shade val="50000"/>
+              </a:schemeClr>
+            </a:lnRef>
+            <a:fillRef idx="1">
+              <a:schemeClr val="accent1"/>
+            </a:fillRef>
+            <a:effectRef idx="0">
+              <a:schemeClr val="accent1"/>
+            </a:effectRef>
+            <a:fontRef idx="minor">
+              <a:schemeClr val="lt1"/>
+            </a:fontRef>
+          </p:style>
+          <p:txBody>
+            <a:bodyPr rtlCol="0" anchor="ctr"/>
+            <a:lstStyle/>
+            <a:p>
+              <a:pPr algn="ctr"/>
+              <a:r>
+                <a:rPr lang="en-US" dirty="0" smtClean="0"/>
+                <a:t>Sun</a:t>
+              </a:r>
+              <a:endParaRPr lang="en-US" dirty="0"/>
+            </a:p>
+          </p:txBody>
+        </p:sp>
+        <p:sp>
+          <p:nvSpPr>
+            <p:cNvPr id="6" name="Rectangle 5"/>
+            <p:cNvSpPr/>
+            <p:nvPr/>
+          </p:nvSpPr>
+          <p:spPr>
+            <a:xfrm>
+              <a:off x="6765956" y="3322622"/>
+              <a:ext cx="914400" cy="479833"/>
+            </a:xfrm>
+            <a:prstGeom prst="rect">
+              <a:avLst/>
+            </a:prstGeom>
+          </p:spPr>
+          <p:style>
+            <a:lnRef idx="2">
+              <a:schemeClr val="accent1">
+                <a:shade val="50000"/>
+              </a:schemeClr>
+            </a:lnRef>
+            <a:fillRef idx="1">
+              <a:schemeClr val="accent1"/>
+            </a:fillRef>
+            <a:effectRef idx="0">
+              <a:schemeClr val="accent1"/>
+            </a:effectRef>
+            <a:fontRef idx="minor">
+              <a:schemeClr val="lt1"/>
+            </a:fontRef>
+          </p:style>
+          <p:txBody>
+            <a:bodyPr rtlCol="0" anchor="ctr"/>
+            <a:lstStyle/>
+            <a:p>
+              <a:pPr algn="ctr"/>
+              <a:r>
+                <a:rPr lang="en-US" dirty="0" smtClean="0"/>
+                <a:t>Rain</a:t>
+              </a:r>
+              <a:endParaRPr lang="en-US" dirty="0"/>
+            </a:p>
+          </p:txBody>
+        </p:sp>
+        <p:cxnSp>
+          <p:nvCxnSpPr>
+            <p:cNvPr id="8" name="Straight Arrow Connector 7"/>
+            <p:cNvCxnSpPr>
+              <a:stCxn id="4" idx="2"/>
+              <a:endCxn id="5" idx="0"/>
+            </p:cNvCxnSpPr>
+            <p:nvPr/>
+          </p:nvCxnSpPr>
+          <p:spPr>
+            <a:xfrm flipH="1">
+              <a:off x="2118510" y="1926125"/>
+              <a:ext cx="1833327" cy="1396498"/>
+            </a:xfrm>
+            <a:prstGeom prst="straightConnector1">
+              <a:avLst/>
+            </a:prstGeom>
+            <a:ln>
+              <a:tailEnd type="arrow"/>
+            </a:ln>
+          </p:spPr>
+          <p:style>
+            <a:lnRef idx="1">
+              <a:schemeClr val="accent1"/>
+            </a:lnRef>
+            <a:fillRef idx="0">
+              <a:schemeClr val="accent1"/>
+            </a:fillRef>
+            <a:effectRef idx="0">
+              <a:schemeClr val="accent1"/>
+            </a:effectRef>
+            <a:fontRef idx="minor">
+              <a:schemeClr val="tx1"/>
+            </a:fontRef>
+          </p:style>
+        </p:cxnSp>
+        <p:cxnSp>
+          <p:nvCxnSpPr>
+            <p:cNvPr id="12" name="Straight Arrow Connector 11"/>
+            <p:cNvCxnSpPr>
+              <a:stCxn id="4" idx="6"/>
+              <a:endCxn id="6" idx="0"/>
+            </p:cNvCxnSpPr>
+            <p:nvPr/>
+          </p:nvCxnSpPr>
+          <p:spPr>
+            <a:xfrm>
+              <a:off x="5205742" y="1926125"/>
+              <a:ext cx="2017414" cy="1396497"/>
+            </a:xfrm>
+            <a:prstGeom prst="straightConnector1">
+              <a:avLst/>
+            </a:prstGeom>
+            <a:ln>
+              <a:tailEnd type="arrow"/>
+            </a:ln>
+          </p:spPr>
+          <p:style>
+            <a:lnRef idx="1">
+              <a:schemeClr val="accent1"/>
+            </a:lnRef>
+            <a:fillRef idx="0">
+              <a:schemeClr val="accent1"/>
+            </a:fillRef>
+            <a:effectRef idx="0">
+              <a:schemeClr val="accent1"/>
+            </a:effectRef>
+            <a:fontRef idx="minor">
+              <a:schemeClr val="tx1"/>
+            </a:fontRef>
+          </p:style>
+        </p:cxnSp>
+        <p:sp>
+          <p:nvSpPr>
+            <p:cNvPr id="14" name="TextBox 13"/>
+            <p:cNvSpPr txBox="1"/>
+            <p:nvPr/>
+          </p:nvSpPr>
+          <p:spPr>
+            <a:xfrm>
+              <a:off x="5954464" y="2067383"/>
+              <a:ext cx="473206" cy="369332"/>
+            </a:xfrm>
+            <a:prstGeom prst="rect">
+              <a:avLst/>
+            </a:prstGeom>
+            <a:noFill/>
+          </p:spPr>
+          <p:txBody>
+            <a:bodyPr wrap="none" rtlCol="0">
+              <a:spAutoFit/>
+            </a:bodyPr>
+            <a:lstStyle/>
+            <a:p>
+              <a:r>
+                <a:rPr lang="en-US" dirty="0" smtClean="0"/>
+                <a:t>0.4</a:t>
+              </a:r>
+              <a:endParaRPr lang="en-US" dirty="0"/>
+            </a:p>
+          </p:txBody>
+        </p:sp>
+        <p:sp>
+          <p:nvSpPr>
+            <p:cNvPr id="15" name="TextBox 14"/>
+            <p:cNvSpPr txBox="1"/>
+            <p:nvPr/>
+          </p:nvSpPr>
+          <p:spPr>
+            <a:xfrm>
+              <a:off x="2648134" y="2152466"/>
+              <a:ext cx="473206" cy="369332"/>
+            </a:xfrm>
+            <a:prstGeom prst="rect">
+              <a:avLst/>
+            </a:prstGeom>
+            <a:noFill/>
+          </p:spPr>
+          <p:txBody>
+            <a:bodyPr wrap="none" rtlCol="0">
+              <a:spAutoFit/>
+            </a:bodyPr>
+            <a:lstStyle/>
+            <a:p>
+              <a:r>
+                <a:rPr lang="en-US" dirty="0" smtClean="0"/>
+                <a:t>0.6</a:t>
+              </a:r>
+              <a:endParaRPr lang="en-US" dirty="0"/>
+            </a:p>
+          </p:txBody>
+        </p:sp>
+        <p:cxnSp>
+          <p:nvCxnSpPr>
+            <p:cNvPr id="31" name="Straight Arrow Connector 30"/>
+            <p:cNvCxnSpPr/>
+            <p:nvPr/>
+          </p:nvCxnSpPr>
+          <p:spPr>
+            <a:xfrm rot="10800000">
+              <a:off x="2575710" y="3322622"/>
+              <a:ext cx="4190246" cy="0"/>
+            </a:xfrm>
+            <a:prstGeom prst="straightConnector1">
+              <a:avLst/>
+            </a:prstGeom>
+            <a:ln>
+              <a:tailEnd type="arrow"/>
+            </a:ln>
+          </p:spPr>
+          <p:style>
+            <a:lnRef idx="1">
+              <a:schemeClr val="accent1"/>
+            </a:lnRef>
+            <a:fillRef idx="0">
+              <a:schemeClr val="accent1"/>
+            </a:fillRef>
+            <a:effectRef idx="0">
+              <a:schemeClr val="accent1"/>
+            </a:effectRef>
+            <a:fontRef idx="minor">
+              <a:schemeClr val="tx1"/>
+            </a:fontRef>
+          </p:style>
+        </p:cxnSp>
+        <p:sp>
+          <p:nvSpPr>
+            <p:cNvPr id="32" name="TextBox 31"/>
+            <p:cNvSpPr txBox="1"/>
+            <p:nvPr/>
+          </p:nvSpPr>
+          <p:spPr>
+            <a:xfrm>
+              <a:off x="4257234" y="3911097"/>
+              <a:ext cx="473206" cy="369332"/>
+            </a:xfrm>
+            <a:prstGeom prst="rect">
+              <a:avLst/>
+            </a:prstGeom>
+            <a:noFill/>
+          </p:spPr>
+          <p:txBody>
+            <a:bodyPr wrap="none" rtlCol="0">
+              <a:spAutoFit/>
+            </a:bodyPr>
+            <a:lstStyle/>
+            <a:p>
+              <a:r>
+                <a:rPr lang="en-US" dirty="0" smtClean="0"/>
+                <a:t>0.2</a:t>
+              </a:r>
+              <a:endParaRPr lang="en-US" dirty="0"/>
+            </a:p>
+          </p:txBody>
+        </p:sp>
+        <p:sp>
+          <p:nvSpPr>
+            <p:cNvPr id="33" name="TextBox 32"/>
+            <p:cNvSpPr txBox="1"/>
+            <p:nvPr/>
+          </p:nvSpPr>
+          <p:spPr>
+            <a:xfrm>
+              <a:off x="4257234" y="2882602"/>
+              <a:ext cx="473206" cy="369332"/>
+            </a:xfrm>
+            <a:prstGeom prst="rect">
+              <a:avLst/>
+            </a:prstGeom>
+            <a:noFill/>
+          </p:spPr>
+          <p:txBody>
+            <a:bodyPr wrap="none" rtlCol="0">
+              <a:spAutoFit/>
+            </a:bodyPr>
+            <a:lstStyle/>
+            <a:p>
+              <a:r>
+                <a:rPr lang="en-US" dirty="0" smtClean="0"/>
+                <a:t>0.7</a:t>
+              </a:r>
+              <a:endParaRPr lang="en-US" dirty="0"/>
+            </a:p>
+          </p:txBody>
+        </p:sp>
+        <p:sp>
+          <p:nvSpPr>
+            <p:cNvPr id="34" name="TextBox 33"/>
+            <p:cNvSpPr txBox="1"/>
+            <p:nvPr/>
+          </p:nvSpPr>
+          <p:spPr>
+            <a:xfrm>
+              <a:off x="865194" y="3137957"/>
+              <a:ext cx="473206" cy="369332"/>
+            </a:xfrm>
+            <a:prstGeom prst="rect">
+              <a:avLst/>
+            </a:prstGeom>
+            <a:noFill/>
+          </p:spPr>
+          <p:txBody>
+            <a:bodyPr wrap="none" rtlCol="0">
+              <a:spAutoFit/>
+            </a:bodyPr>
+            <a:lstStyle/>
+            <a:p>
+              <a:r>
+                <a:rPr lang="en-US" dirty="0" smtClean="0"/>
+                <a:t>0.8</a:t>
+              </a:r>
+              <a:endParaRPr lang="en-US" dirty="0"/>
+            </a:p>
+          </p:txBody>
+        </p:sp>
+        <p:cxnSp>
+          <p:nvCxnSpPr>
+            <p:cNvPr id="71" name="Elbow Connector 70"/>
+            <p:cNvCxnSpPr>
+              <a:endCxn id="6" idx="3"/>
+            </p:cNvCxnSpPr>
+            <p:nvPr/>
+          </p:nvCxnSpPr>
+          <p:spPr>
+            <a:xfrm rot="16200000" flipH="1">
+              <a:off x="7481936" y="3364118"/>
+              <a:ext cx="239915" cy="156926"/>
+            </a:xfrm>
+            <a:prstGeom prst="bentConnector4">
+              <a:avLst>
+                <a:gd name="adj1" fmla="val 295284"/>
+                <a:gd name="adj2" fmla="val 245674"/>
+              </a:avLst>
+            </a:prstGeom>
+            <a:ln>
+              <a:tailEnd type="arrow"/>
+            </a:ln>
+          </p:spPr>
+          <p:style>
+            <a:lnRef idx="1">
+              <a:schemeClr val="accent1"/>
+            </a:lnRef>
+            <a:fillRef idx="0">
+              <a:schemeClr val="accent1"/>
+            </a:fillRef>
+            <a:effectRef idx="0">
+              <a:schemeClr val="accent1"/>
+            </a:effectRef>
+            <a:fontRef idx="minor">
+              <a:schemeClr val="tx1"/>
+            </a:fontRef>
+          </p:style>
+        </p:cxnSp>
+        <p:sp>
+          <p:nvSpPr>
+            <p:cNvPr id="74" name="Rectangle 73"/>
+            <p:cNvSpPr/>
+            <p:nvPr/>
+          </p:nvSpPr>
+          <p:spPr>
+            <a:xfrm>
+              <a:off x="8003263" y="3617789"/>
+              <a:ext cx="538681" cy="369332"/>
+            </a:xfrm>
+            <a:prstGeom prst="rect">
+              <a:avLst/>
+            </a:prstGeom>
+          </p:spPr>
+          <p:txBody>
+            <a:bodyPr wrap="square">
+              <a:spAutoFit/>
+            </a:bodyPr>
+            <a:lstStyle/>
+            <a:p>
+              <a:r>
+                <a:rPr lang="en-US" dirty="0" smtClean="0"/>
+                <a:t>0.3</a:t>
+              </a:r>
+              <a:endParaRPr lang="en-US" dirty="0"/>
+            </a:p>
+          </p:txBody>
+        </p:sp>
+      </p:grpSp>
+    </p:spTree>
+  </p:cSld>
+  <p:clrMapOvr>
+    <a:masterClrMapping/>
+  </p:clrMapOvr>
+</p:sld>
+</file>
+
+<file path=ppt/slides/slide4.xml><?xml version="1.0" encoding="utf-8"?>
+<p:sld xmlns:a="http://schemas.openxmlformats.org/drawingml/2006/main" xmlns:r="http://schemas.openxmlformats.org/officeDocument/2006/relationships" xmlns:p="http://schemas.openxmlformats.org/presentationml/2006/main">
+  <p:cSld>
+    <p:spTree>
+      <p:nvGrpSpPr>
+        <p:cNvPr id="1" name=""/>
+        <p:cNvGrpSpPr/>
+        <p:nvPr/>
+      </p:nvGrpSpPr>
+      <p:grpSpPr>
+        <a:xfrm>
+          <a:off x="0" y="0"/>
+          <a:ext cx="0" cy="0"/>
+          <a:chOff x="0" y="0"/>
+          <a:chExt cx="0" cy="0"/>
+        </a:xfrm>
+      </p:grpSpPr>
+      <p:sp>
+        <p:nvSpPr>
+          <p:cNvPr id="2" name="Title 1"/>
+          <p:cNvSpPr>
+            <a:spLocks noGrp="1"/>
+          </p:cNvSpPr>
+          <p:nvPr>
+            <p:ph type="title"/>
+          </p:nvPr>
+        </p:nvSpPr>
+        <p:spPr/>
+        <p:txBody>
+          <a:bodyPr/>
+          <a:lstStyle/>
+          <a:p>
+            <a:r>
+              <a:rPr lang="en-US" sz="4400" dirty="0" smtClean="0"/>
+              <a:t>Hidden Markov Model (HMM)</a:t>
+            </a:r>
+            <a:endParaRPr lang="en-US" sz="4400" dirty="0"/>
+          </a:p>
+        </p:txBody>
+      </p:sp>
+      <p:grpSp>
+        <p:nvGrpSpPr>
+          <p:cNvPr id="68" name="Group 67"/>
+          <p:cNvGrpSpPr/>
+          <p:nvPr/>
+        </p:nvGrpSpPr>
+        <p:grpSpPr>
+          <a:xfrm>
+            <a:off x="457200" y="1812554"/>
+            <a:ext cx="8007790" cy="3360569"/>
+            <a:chOff x="457200" y="1812554"/>
+            <a:chExt cx="8007790" cy="3360569"/>
+          </a:xfrm>
+        </p:grpSpPr>
+        <p:grpSp>
+          <p:nvGrpSpPr>
+            <p:cNvPr id="26" name="Group 25"/>
+            <p:cNvGrpSpPr/>
+            <p:nvPr/>
+          </p:nvGrpSpPr>
+          <p:grpSpPr>
+            <a:xfrm>
+              <a:off x="532646" y="2209045"/>
+              <a:ext cx="7767870" cy="362138"/>
+              <a:chOff x="532646" y="1846907"/>
+              <a:chExt cx="7767870" cy="362138"/>
+            </a:xfrm>
+          </p:grpSpPr>
+          <p:sp>
+            <p:nvSpPr>
+              <p:cNvPr id="4" name="Rounded Rectangle 3"/>
+              <p:cNvSpPr/>
+              <p:nvPr/>
+            </p:nvSpPr>
+            <p:spPr>
+              <a:xfrm>
+                <a:off x="532646" y="1846907"/>
+                <a:ext cx="706170" cy="362138"/>
+              </a:xfrm>
+              <a:prstGeom prst="roundRect">
+                <a:avLst/>
+              </a:prstGeom>
+            </p:spPr>
+            <p:style>
+              <a:lnRef idx="2">
+                <a:schemeClr val="accent1">
+                  <a:shade val="50000"/>
+                </a:schemeClr>
+              </a:lnRef>
+              <a:fillRef idx="1">
+                <a:schemeClr val="accent1"/>
+              </a:fillRef>
+              <a:effectRef idx="0">
+                <a:schemeClr val="accent1"/>
+              </a:effectRef>
+              <a:fontRef idx="minor">
+                <a:schemeClr val="lt1"/>
+              </a:fontRef>
+            </p:style>
+            <p:txBody>
+              <a:bodyPr rtlCol="0" anchor="ctr"/>
+              <a:lstStyle/>
+              <a:p>
+                <a:pPr algn="ctr"/>
+                <a:r>
+                  <a:rPr lang="en-US" dirty="0" smtClean="0"/>
+                  <a:t>X</a:t>
+                </a:r>
+                <a:r>
+                  <a:rPr lang="en-US" baseline="-25000" dirty="0" smtClean="0"/>
+                  <a:t>1</a:t>
+                </a:r>
+                <a:endParaRPr lang="en-US" dirty="0"/>
+              </a:p>
+            </p:txBody>
+          </p:sp>
+          <p:sp>
+            <p:nvSpPr>
+              <p:cNvPr id="5" name="Rounded Rectangle 4"/>
+              <p:cNvSpPr/>
+              <p:nvPr/>
+            </p:nvSpPr>
+            <p:spPr>
+              <a:xfrm>
+                <a:off x="1944986" y="1846907"/>
+                <a:ext cx="706170" cy="362138"/>
+              </a:xfrm>
+              <a:prstGeom prst="roundRect">
+                <a:avLst/>
+              </a:prstGeom>
+            </p:spPr>
+            <p:style>
+              <a:lnRef idx="2">
+                <a:schemeClr val="accent1">
+                  <a:shade val="50000"/>
+                </a:schemeClr>
+              </a:lnRef>
+              <a:fillRef idx="1">
+                <a:schemeClr val="accent1"/>
+              </a:fillRef>
+              <a:effectRef idx="0">
+                <a:schemeClr val="accent1"/>
+              </a:effectRef>
+              <a:fontRef idx="minor">
+                <a:schemeClr val="lt1"/>
+              </a:fontRef>
+            </p:style>
+            <p:txBody>
+              <a:bodyPr rtlCol="0" anchor="ctr"/>
+              <a:lstStyle/>
+              <a:p>
+                <a:pPr algn="ctr"/>
+                <a:r>
+                  <a:rPr lang="en-US" dirty="0" smtClean="0"/>
+                  <a:t>X</a:t>
+                </a:r>
+                <a:r>
+                  <a:rPr lang="en-US" baseline="-25000" dirty="0" smtClean="0"/>
+                  <a:t>2</a:t>
+                </a:r>
+                <a:endParaRPr lang="en-US" dirty="0"/>
+              </a:p>
+            </p:txBody>
+          </p:sp>
+          <p:sp>
+            <p:nvSpPr>
+              <p:cNvPr id="6" name="Rounded Rectangle 5"/>
+              <p:cNvSpPr/>
+              <p:nvPr/>
+            </p:nvSpPr>
+            <p:spPr>
+              <a:xfrm>
+                <a:off x="7594346" y="1846907"/>
+                <a:ext cx="706170" cy="362138"/>
+              </a:xfrm>
+              <a:prstGeom prst="roundRect">
+                <a:avLst/>
+              </a:prstGeom>
+            </p:spPr>
+            <p:style>
+              <a:lnRef idx="2">
+                <a:schemeClr val="accent1">
+                  <a:shade val="50000"/>
+                </a:schemeClr>
+              </a:lnRef>
+              <a:fillRef idx="1">
+                <a:schemeClr val="accent1"/>
+              </a:fillRef>
+              <a:effectRef idx="0">
+                <a:schemeClr val="accent1"/>
+              </a:effectRef>
+              <a:fontRef idx="minor">
+                <a:schemeClr val="lt1"/>
+              </a:fontRef>
+            </p:style>
+            <p:txBody>
+              <a:bodyPr rtlCol="0" anchor="ctr"/>
+              <a:lstStyle/>
+              <a:p>
+                <a:pPr algn="ctr"/>
+                <a:r>
+                  <a:rPr lang="en-US" dirty="0" smtClean="0"/>
+                  <a:t>X</a:t>
+                </a:r>
+                <a:r>
+                  <a:rPr lang="en-US" baseline="-25000" dirty="0" smtClean="0"/>
+                  <a:t>6</a:t>
+                </a:r>
+                <a:endParaRPr lang="en-US" dirty="0"/>
+              </a:p>
+            </p:txBody>
+          </p:sp>
+          <p:sp>
+            <p:nvSpPr>
+              <p:cNvPr id="7" name="Rounded Rectangle 6"/>
+              <p:cNvSpPr/>
+              <p:nvPr/>
+            </p:nvSpPr>
+            <p:spPr>
+              <a:xfrm>
+                <a:off x="3357326" y="1846907"/>
+                <a:ext cx="706170" cy="362138"/>
+              </a:xfrm>
+              <a:prstGeom prst="roundRect">
+                <a:avLst/>
+              </a:prstGeom>
+            </p:spPr>
+            <p:style>
+              <a:lnRef idx="2">
+                <a:schemeClr val="accent1">
+                  <a:shade val="50000"/>
+                </a:schemeClr>
+              </a:lnRef>
+              <a:fillRef idx="1">
+                <a:schemeClr val="accent1"/>
+              </a:fillRef>
+              <a:effectRef idx="0">
+                <a:schemeClr val="accent1"/>
+              </a:effectRef>
+              <a:fontRef idx="minor">
+                <a:schemeClr val="lt1"/>
+              </a:fontRef>
+            </p:style>
+            <p:txBody>
+              <a:bodyPr rtlCol="0" anchor="ctr"/>
+              <a:lstStyle/>
+              <a:p>
+                <a:pPr algn="ctr"/>
+                <a:r>
+                  <a:rPr lang="en-US" dirty="0" smtClean="0"/>
+                  <a:t>X</a:t>
+                </a:r>
+                <a:r>
+                  <a:rPr lang="en-US" baseline="-25000" dirty="0" smtClean="0"/>
+                  <a:t>3</a:t>
+                </a:r>
+                <a:endParaRPr lang="en-US" dirty="0"/>
+              </a:p>
+            </p:txBody>
+          </p:sp>
+          <p:sp>
+            <p:nvSpPr>
+              <p:cNvPr id="8" name="Rounded Rectangle 7"/>
+              <p:cNvSpPr/>
+              <p:nvPr/>
+            </p:nvSpPr>
+            <p:spPr>
+              <a:xfrm>
+                <a:off x="6182006" y="1846907"/>
+                <a:ext cx="706170" cy="362138"/>
+              </a:xfrm>
+              <a:prstGeom prst="roundRect">
+                <a:avLst/>
+              </a:prstGeom>
+            </p:spPr>
+            <p:style>
+              <a:lnRef idx="2">
+                <a:schemeClr val="accent1">
+                  <a:shade val="50000"/>
+                </a:schemeClr>
+              </a:lnRef>
+              <a:fillRef idx="1">
+                <a:schemeClr val="accent1"/>
+              </a:fillRef>
+              <a:effectRef idx="0">
+                <a:schemeClr val="accent1"/>
+              </a:effectRef>
+              <a:fontRef idx="minor">
+                <a:schemeClr val="lt1"/>
+              </a:fontRef>
+            </p:style>
+            <p:txBody>
+              <a:bodyPr rtlCol="0" anchor="ctr"/>
+              <a:lstStyle/>
+              <a:p>
+                <a:pPr algn="ctr"/>
+                <a:r>
+                  <a:rPr lang="en-US" dirty="0" smtClean="0"/>
+                  <a:t>X</a:t>
+                </a:r>
+                <a:r>
+                  <a:rPr lang="en-US" baseline="-25000" dirty="0" smtClean="0"/>
+                  <a:t>5</a:t>
+                </a:r>
+                <a:endParaRPr lang="en-US" dirty="0"/>
+              </a:p>
+            </p:txBody>
+          </p:sp>
+          <p:sp>
+            <p:nvSpPr>
+              <p:cNvPr id="9" name="Rounded Rectangle 8"/>
+              <p:cNvSpPr/>
+              <p:nvPr/>
+            </p:nvSpPr>
+            <p:spPr>
+              <a:xfrm>
+                <a:off x="4769666" y="1846907"/>
+                <a:ext cx="706170" cy="362138"/>
+              </a:xfrm>
+              <a:prstGeom prst="roundRect">
+                <a:avLst/>
+              </a:prstGeom>
+            </p:spPr>
+            <p:style>
+              <a:lnRef idx="2">
+                <a:schemeClr val="accent1">
+                  <a:shade val="50000"/>
+                </a:schemeClr>
+              </a:lnRef>
+              <a:fillRef idx="1">
+                <a:schemeClr val="accent1"/>
+              </a:fillRef>
+              <a:effectRef idx="0">
+                <a:schemeClr val="accent1"/>
+              </a:effectRef>
+              <a:fontRef idx="minor">
+                <a:schemeClr val="lt1"/>
+              </a:fontRef>
+            </p:style>
+            <p:txBody>
+              <a:bodyPr rtlCol="0" anchor="ctr"/>
+              <a:lstStyle/>
+              <a:p>
+                <a:pPr algn="ctr"/>
+                <a:r>
+                  <a:rPr lang="en-US" dirty="0" smtClean="0"/>
+                  <a:t>X</a:t>
+                </a:r>
+                <a:r>
+                  <a:rPr lang="en-US" baseline="-25000" dirty="0" smtClean="0"/>
+                  <a:t>4</a:t>
+                </a:r>
+                <a:endParaRPr lang="en-US" dirty="0"/>
+              </a:p>
+            </p:txBody>
+          </p:sp>
+          <p:cxnSp>
+            <p:nvCxnSpPr>
+              <p:cNvPr id="11" name="Straight Arrow Connector 10"/>
+              <p:cNvCxnSpPr>
+                <a:stCxn id="4" idx="3"/>
+                <a:endCxn id="5" idx="1"/>
+              </p:cNvCxnSpPr>
+              <p:nvPr/>
+            </p:nvCxnSpPr>
+            <p:spPr>
+              <a:xfrm>
+                <a:off x="1238816" y="2027976"/>
+                <a:ext cx="706170" cy="0"/>
+              </a:xfrm>
+              <a:prstGeom prst="straightConnector1">
+                <a:avLst/>
+              </a:prstGeom>
+              <a:ln>
+                <a:tailEnd type="arrow"/>
+              </a:ln>
+            </p:spPr>
+            <p:style>
+              <a:lnRef idx="1">
+                <a:schemeClr val="accent1"/>
+              </a:lnRef>
+              <a:fillRef idx="0">
+                <a:schemeClr val="accent1"/>
+              </a:fillRef>
+              <a:effectRef idx="0">
+                <a:schemeClr val="accent1"/>
+              </a:effectRef>
+              <a:fontRef idx="minor">
+                <a:schemeClr val="tx1"/>
+              </a:fontRef>
+            </p:style>
+          </p:cxnSp>
+          <p:cxnSp>
+            <p:nvCxnSpPr>
+              <p:cNvPr id="12" name="Straight Arrow Connector 11"/>
+              <p:cNvCxnSpPr>
+                <a:stCxn id="5" idx="3"/>
+                <a:endCxn id="7" idx="1"/>
+              </p:cNvCxnSpPr>
+              <p:nvPr/>
+            </p:nvCxnSpPr>
+            <p:spPr>
+              <a:xfrm>
+                <a:off x="2651156" y="2027976"/>
+                <a:ext cx="706170" cy="0"/>
+              </a:xfrm>
+              <a:prstGeom prst="straightConnector1">
+                <a:avLst/>
+              </a:prstGeom>
+              <a:ln>
+                <a:tailEnd type="arrow"/>
+              </a:ln>
+            </p:spPr>
+            <p:style>
+              <a:lnRef idx="1">
+                <a:schemeClr val="accent1"/>
+              </a:lnRef>
+              <a:fillRef idx="0">
+                <a:schemeClr val="accent1"/>
+              </a:fillRef>
+              <a:effectRef idx="0">
+                <a:schemeClr val="accent1"/>
+              </a:effectRef>
+              <a:fontRef idx="minor">
+                <a:schemeClr val="tx1"/>
+              </a:fontRef>
+            </p:style>
+          </p:cxnSp>
+          <p:cxnSp>
+            <p:nvCxnSpPr>
+              <p:cNvPr id="13" name="Straight Arrow Connector 12"/>
+              <p:cNvCxnSpPr>
+                <a:stCxn id="7" idx="3"/>
+                <a:endCxn id="9" idx="1"/>
+              </p:cNvCxnSpPr>
+              <p:nvPr/>
+            </p:nvCxnSpPr>
+            <p:spPr>
+              <a:xfrm>
+                <a:off x="4063496" y="2027976"/>
+                <a:ext cx="706170" cy="0"/>
+              </a:xfrm>
+              <a:prstGeom prst="straightConnector1">
+                <a:avLst/>
+              </a:prstGeom>
+              <a:ln>
+                <a:tailEnd type="arrow"/>
+              </a:ln>
+            </p:spPr>
+            <p:style>
+              <a:lnRef idx="1">
+                <a:schemeClr val="accent1"/>
+              </a:lnRef>
+              <a:fillRef idx="0">
+                <a:schemeClr val="accent1"/>
+              </a:fillRef>
+              <a:effectRef idx="0">
+                <a:schemeClr val="accent1"/>
+              </a:effectRef>
+              <a:fontRef idx="minor">
+                <a:schemeClr val="tx1"/>
+              </a:fontRef>
+            </p:style>
+          </p:cxnSp>
+          <p:cxnSp>
+            <p:nvCxnSpPr>
+              <p:cNvPr id="14" name="Straight Arrow Connector 13"/>
+              <p:cNvCxnSpPr>
+                <a:stCxn id="9" idx="3"/>
+                <a:endCxn id="8" idx="1"/>
+              </p:cNvCxnSpPr>
+              <p:nvPr/>
+            </p:nvCxnSpPr>
+            <p:spPr>
+              <a:xfrm>
+                <a:off x="5475836" y="2027976"/>
+                <a:ext cx="706170" cy="0"/>
+              </a:xfrm>
+              <a:prstGeom prst="straightConnector1">
+                <a:avLst/>
+              </a:prstGeom>
+              <a:ln>
+                <a:tailEnd type="arrow"/>
+              </a:ln>
+            </p:spPr>
+            <p:style>
+              <a:lnRef idx="1">
+                <a:schemeClr val="accent1"/>
+              </a:lnRef>
+              <a:fillRef idx="0">
+                <a:schemeClr val="accent1"/>
+              </a:fillRef>
+              <a:effectRef idx="0">
+                <a:schemeClr val="accent1"/>
+              </a:effectRef>
+              <a:fontRef idx="minor">
+                <a:schemeClr val="tx1"/>
+              </a:fontRef>
+            </p:style>
+          </p:cxnSp>
+          <p:cxnSp>
+            <p:nvCxnSpPr>
+              <p:cNvPr id="15" name="Straight Arrow Connector 14"/>
+              <p:cNvCxnSpPr>
+                <a:stCxn id="8" idx="3"/>
+                <a:endCxn id="6" idx="1"/>
+              </p:cNvCxnSpPr>
+              <p:nvPr/>
+            </p:nvCxnSpPr>
+            <p:spPr>
+              <a:xfrm>
+                <a:off x="6888176" y="2027976"/>
+                <a:ext cx="706170" cy="0"/>
+              </a:xfrm>
+              <a:prstGeom prst="straightConnector1">
+                <a:avLst/>
+              </a:prstGeom>
+              <a:ln>
+                <a:tailEnd type="arrow"/>
+              </a:ln>
+            </p:spPr>
+            <p:style>
+              <a:lnRef idx="1">
+                <a:schemeClr val="accent1"/>
+              </a:lnRef>
+              <a:fillRef idx="0">
+                <a:schemeClr val="accent1"/>
+              </a:fillRef>
+              <a:effectRef idx="0">
+                <a:schemeClr val="accent1"/>
+              </a:effectRef>
+              <a:fontRef idx="minor">
+                <a:schemeClr val="tx1"/>
+              </a:fontRef>
+            </p:style>
+          </p:cxnSp>
+        </p:grpSp>
+        <p:grpSp>
+          <p:nvGrpSpPr>
+            <p:cNvPr id="57" name="Group 56"/>
+            <p:cNvGrpSpPr/>
+            <p:nvPr/>
+          </p:nvGrpSpPr>
+          <p:grpSpPr>
+            <a:xfrm>
+              <a:off x="532646" y="4363771"/>
+              <a:ext cx="7767870" cy="362138"/>
+              <a:chOff x="532646" y="3612333"/>
+              <a:chExt cx="7767870" cy="362138"/>
+            </a:xfrm>
+          </p:grpSpPr>
+          <p:sp>
+            <p:nvSpPr>
+              <p:cNvPr id="28" name="Rounded Rectangle 27"/>
+              <p:cNvSpPr/>
+              <p:nvPr/>
+            </p:nvSpPr>
+            <p:spPr>
+              <a:xfrm>
+                <a:off x="532646" y="3612333"/>
+                <a:ext cx="706170" cy="362138"/>
+              </a:xfrm>
+              <a:prstGeom prst="roundRect">
+                <a:avLst/>
+              </a:prstGeom>
+            </p:spPr>
+            <p:style>
+              <a:lnRef idx="2">
+                <a:schemeClr val="accent3">
+                  <a:shade val="50000"/>
+                </a:schemeClr>
+              </a:lnRef>
+              <a:fillRef idx="1">
+                <a:schemeClr val="accent3"/>
+              </a:fillRef>
+              <a:effectRef idx="0">
+                <a:schemeClr val="accent3"/>
+              </a:effectRef>
+              <a:fontRef idx="minor">
+                <a:schemeClr val="lt1"/>
+              </a:fontRef>
+            </p:style>
+            <p:txBody>
+              <a:bodyPr rtlCol="0" anchor="ctr"/>
+              <a:lstStyle/>
+              <a:p>
+                <a:pPr algn="ctr"/>
+                <a:r>
+                  <a:rPr lang="en-US" dirty="0" smtClean="0"/>
+                  <a:t>O</a:t>
+                </a:r>
+                <a:r>
+                  <a:rPr lang="en-US" baseline="-25000" dirty="0" smtClean="0"/>
+                  <a:t>1</a:t>
+                </a:r>
+                <a:endParaRPr lang="en-US" dirty="0"/>
+              </a:p>
+            </p:txBody>
+          </p:sp>
+          <p:sp>
+            <p:nvSpPr>
+              <p:cNvPr id="29" name="Rounded Rectangle 28"/>
+              <p:cNvSpPr/>
+              <p:nvPr/>
+            </p:nvSpPr>
+            <p:spPr>
+              <a:xfrm>
+                <a:off x="1944986" y="3612333"/>
+                <a:ext cx="706170" cy="362138"/>
+              </a:xfrm>
+              <a:prstGeom prst="roundRect">
+                <a:avLst/>
+              </a:prstGeom>
+            </p:spPr>
+            <p:style>
+              <a:lnRef idx="2">
+                <a:schemeClr val="accent3">
+                  <a:shade val="50000"/>
+                </a:schemeClr>
+              </a:lnRef>
+              <a:fillRef idx="1">
+                <a:schemeClr val="accent3"/>
+              </a:fillRef>
+              <a:effectRef idx="0">
+                <a:schemeClr val="accent3"/>
+              </a:effectRef>
+              <a:fontRef idx="minor">
+                <a:schemeClr val="lt1"/>
+              </a:fontRef>
+            </p:style>
+            <p:txBody>
+              <a:bodyPr rtlCol="0" anchor="ctr"/>
+              <a:lstStyle/>
+              <a:p>
+                <a:pPr algn="ctr"/>
+                <a:r>
+                  <a:rPr lang="en-US" dirty="0" smtClean="0"/>
+                  <a:t>O</a:t>
+                </a:r>
+                <a:r>
+                  <a:rPr lang="en-US" baseline="-25000" dirty="0" smtClean="0"/>
+                  <a:t>2</a:t>
+                </a:r>
+                <a:endParaRPr lang="en-US" dirty="0"/>
+              </a:p>
+            </p:txBody>
+          </p:sp>
+          <p:sp>
+            <p:nvSpPr>
+              <p:cNvPr id="30" name="Rounded Rectangle 29"/>
+              <p:cNvSpPr/>
+              <p:nvPr/>
+            </p:nvSpPr>
+            <p:spPr>
+              <a:xfrm>
+                <a:off x="3357326" y="3612333"/>
+                <a:ext cx="706170" cy="362138"/>
+              </a:xfrm>
+              <a:prstGeom prst="roundRect">
+                <a:avLst/>
+              </a:prstGeom>
+            </p:spPr>
+            <p:style>
+              <a:lnRef idx="2">
+                <a:schemeClr val="accent3">
+                  <a:shade val="50000"/>
+                </a:schemeClr>
+              </a:lnRef>
+              <a:fillRef idx="1">
+                <a:schemeClr val="accent3"/>
+              </a:fillRef>
+              <a:effectRef idx="0">
+                <a:schemeClr val="accent3"/>
+              </a:effectRef>
+              <a:fontRef idx="minor">
+                <a:schemeClr val="lt1"/>
+              </a:fontRef>
+            </p:style>
+            <p:txBody>
+              <a:bodyPr rtlCol="0" anchor="ctr"/>
+              <a:lstStyle/>
+              <a:p>
+                <a:pPr algn="ctr"/>
+                <a:r>
+                  <a:rPr lang="en-US" dirty="0" smtClean="0"/>
+                  <a:t>O</a:t>
+                </a:r>
+                <a:r>
+                  <a:rPr lang="en-US" baseline="-25000" dirty="0" smtClean="0"/>
+                  <a:t>3</a:t>
+                </a:r>
+                <a:endParaRPr lang="en-US" dirty="0"/>
+              </a:p>
+            </p:txBody>
+          </p:sp>
+          <p:sp>
+            <p:nvSpPr>
+              <p:cNvPr id="31" name="Rounded Rectangle 30"/>
+              <p:cNvSpPr/>
+              <p:nvPr/>
+            </p:nvSpPr>
+            <p:spPr>
+              <a:xfrm>
+                <a:off x="4769666" y="3612333"/>
+                <a:ext cx="706170" cy="362138"/>
+              </a:xfrm>
+              <a:prstGeom prst="roundRect">
+                <a:avLst/>
+              </a:prstGeom>
+            </p:spPr>
+            <p:style>
+              <a:lnRef idx="2">
+                <a:schemeClr val="accent3">
+                  <a:shade val="50000"/>
+                </a:schemeClr>
+              </a:lnRef>
+              <a:fillRef idx="1">
+                <a:schemeClr val="accent3"/>
+              </a:fillRef>
+              <a:effectRef idx="0">
+                <a:schemeClr val="accent3"/>
+              </a:effectRef>
+              <a:fontRef idx="minor">
+                <a:schemeClr val="lt1"/>
+              </a:fontRef>
+            </p:style>
+            <p:txBody>
+              <a:bodyPr rtlCol="0" anchor="ctr"/>
+              <a:lstStyle/>
+              <a:p>
+                <a:pPr algn="ctr"/>
+                <a:r>
+                  <a:rPr lang="en-US" dirty="0" smtClean="0"/>
+                  <a:t>O</a:t>
+                </a:r>
+                <a:r>
+                  <a:rPr lang="en-US" baseline="-25000" dirty="0" smtClean="0"/>
+                  <a:t>4</a:t>
+                </a:r>
+                <a:endParaRPr lang="en-US" dirty="0"/>
+              </a:p>
+            </p:txBody>
+          </p:sp>
+          <p:sp>
+            <p:nvSpPr>
+              <p:cNvPr id="32" name="Rounded Rectangle 31"/>
+              <p:cNvSpPr/>
+              <p:nvPr/>
+            </p:nvSpPr>
+            <p:spPr>
+              <a:xfrm>
+                <a:off x="6182006" y="3612333"/>
+                <a:ext cx="706170" cy="362138"/>
+              </a:xfrm>
+              <a:prstGeom prst="roundRect">
+                <a:avLst/>
+              </a:prstGeom>
+            </p:spPr>
+            <p:style>
+              <a:lnRef idx="2">
+                <a:schemeClr val="accent3">
+                  <a:shade val="50000"/>
+                </a:schemeClr>
+              </a:lnRef>
+              <a:fillRef idx="1">
+                <a:schemeClr val="accent3"/>
+              </a:fillRef>
+              <a:effectRef idx="0">
+                <a:schemeClr val="accent3"/>
+              </a:effectRef>
+              <a:fontRef idx="minor">
+                <a:schemeClr val="lt1"/>
+              </a:fontRef>
+            </p:style>
+            <p:txBody>
+              <a:bodyPr rtlCol="0" anchor="ctr"/>
+              <a:lstStyle/>
+              <a:p>
+                <a:pPr algn="ctr"/>
+                <a:r>
+                  <a:rPr lang="en-US" dirty="0" smtClean="0"/>
+                  <a:t>O</a:t>
+                </a:r>
+                <a:r>
+                  <a:rPr lang="en-US" baseline="-25000" dirty="0" smtClean="0"/>
+                  <a:t>5</a:t>
+                </a:r>
+                <a:endParaRPr lang="en-US" dirty="0"/>
+              </a:p>
+            </p:txBody>
+          </p:sp>
+          <p:sp>
+            <p:nvSpPr>
+              <p:cNvPr id="33" name="Rounded Rectangle 32"/>
+              <p:cNvSpPr/>
+              <p:nvPr/>
+            </p:nvSpPr>
+            <p:spPr>
+              <a:xfrm>
+                <a:off x="7594346" y="3612333"/>
+                <a:ext cx="706170" cy="362138"/>
+              </a:xfrm>
+              <a:prstGeom prst="roundRect">
+                <a:avLst/>
+              </a:prstGeom>
+            </p:spPr>
+            <p:style>
+              <a:lnRef idx="2">
+                <a:schemeClr val="accent3">
+                  <a:shade val="50000"/>
+                </a:schemeClr>
+              </a:lnRef>
+              <a:fillRef idx="1">
+                <a:schemeClr val="accent3"/>
+              </a:fillRef>
+              <a:effectRef idx="0">
+                <a:schemeClr val="accent3"/>
+              </a:effectRef>
+              <a:fontRef idx="minor">
+                <a:schemeClr val="lt1"/>
+              </a:fontRef>
+            </p:style>
+            <p:txBody>
+              <a:bodyPr rtlCol="0" anchor="ctr"/>
+              <a:lstStyle/>
+              <a:p>
+                <a:pPr algn="ctr"/>
+                <a:r>
+                  <a:rPr lang="en-US" dirty="0" smtClean="0"/>
+                  <a:t>O</a:t>
+                </a:r>
+                <a:r>
+                  <a:rPr lang="en-US" baseline="-25000" dirty="0" smtClean="0"/>
+                  <a:t>6</a:t>
+                </a:r>
+                <a:endParaRPr lang="en-US" dirty="0"/>
+              </a:p>
+            </p:txBody>
+          </p:sp>
+        </p:grpSp>
+        <p:cxnSp>
+          <p:nvCxnSpPr>
+            <p:cNvPr id="39" name="Straight Arrow Connector 38"/>
+            <p:cNvCxnSpPr>
+              <a:stCxn id="4" idx="2"/>
+              <a:endCxn id="28" idx="0"/>
+            </p:cNvCxnSpPr>
+            <p:nvPr/>
+          </p:nvCxnSpPr>
+          <p:spPr>
+            <a:xfrm>
+              <a:off x="885731" y="2571183"/>
+              <a:ext cx="0" cy="1792588"/>
+            </a:xfrm>
+            <a:prstGeom prst="straightConnector1">
+              <a:avLst/>
+            </a:prstGeom>
+            <a:ln>
+              <a:tailEnd type="arrow"/>
+            </a:ln>
+          </p:spPr>
+          <p:style>
+            <a:lnRef idx="2">
+              <a:schemeClr val="dk1"/>
+            </a:lnRef>
+            <a:fillRef idx="0">
+              <a:schemeClr val="dk1"/>
+            </a:fillRef>
+            <a:effectRef idx="1">
+              <a:schemeClr val="dk1"/>
+            </a:effectRef>
+            <a:fontRef idx="minor">
+              <a:schemeClr val="tx1"/>
+            </a:fontRef>
+          </p:style>
+        </p:cxnSp>
+        <p:cxnSp>
+          <p:nvCxnSpPr>
+            <p:cNvPr id="41" name="Straight Arrow Connector 40"/>
+            <p:cNvCxnSpPr>
+              <a:stCxn id="5" idx="2"/>
+              <a:endCxn id="29" idx="0"/>
+            </p:cNvCxnSpPr>
+            <p:nvPr/>
+          </p:nvCxnSpPr>
+          <p:spPr>
+            <a:xfrm>
+              <a:off x="2298071" y="2571183"/>
+              <a:ext cx="0" cy="1792588"/>
+            </a:xfrm>
+            <a:prstGeom prst="straightConnector1">
+              <a:avLst/>
+            </a:prstGeom>
+            <a:ln>
+              <a:tailEnd type="arrow"/>
+            </a:ln>
+          </p:spPr>
+          <p:style>
+            <a:lnRef idx="2">
+              <a:schemeClr val="dk1"/>
+            </a:lnRef>
+            <a:fillRef idx="0">
+              <a:schemeClr val="dk1"/>
+            </a:fillRef>
+            <a:effectRef idx="1">
+              <a:schemeClr val="dk1"/>
+            </a:effectRef>
+            <a:fontRef idx="minor">
+              <a:schemeClr val="tx1"/>
+            </a:fontRef>
+          </p:style>
+        </p:cxnSp>
+        <p:cxnSp>
+          <p:nvCxnSpPr>
+            <p:cNvPr id="45" name="Straight Arrow Connector 44"/>
+            <p:cNvCxnSpPr>
+              <a:stCxn id="8" idx="2"/>
+              <a:endCxn id="32" idx="0"/>
+            </p:cNvCxnSpPr>
+            <p:nvPr/>
+          </p:nvCxnSpPr>
+          <p:spPr>
+            <a:xfrm>
+              <a:off x="6535091" y="2571183"/>
+              <a:ext cx="0" cy="1792588"/>
+            </a:xfrm>
+            <a:prstGeom prst="straightConnector1">
+              <a:avLst/>
+            </a:prstGeom>
+            <a:ln>
+              <a:tailEnd type="arrow"/>
+            </a:ln>
+          </p:spPr>
+          <p:style>
+            <a:lnRef idx="2">
+              <a:schemeClr val="dk1"/>
+            </a:lnRef>
+            <a:fillRef idx="0">
+              <a:schemeClr val="dk1"/>
+            </a:fillRef>
+            <a:effectRef idx="1">
+              <a:schemeClr val="dk1"/>
+            </a:effectRef>
+            <a:fontRef idx="minor">
+              <a:schemeClr val="tx1"/>
+            </a:fontRef>
+          </p:style>
+        </p:cxnSp>
+        <p:cxnSp>
+          <p:nvCxnSpPr>
+            <p:cNvPr id="46" name="Straight Arrow Connector 45"/>
+            <p:cNvCxnSpPr>
+              <a:stCxn id="9" idx="2"/>
+              <a:endCxn id="31" idx="0"/>
+            </p:cNvCxnSpPr>
+            <p:nvPr/>
+          </p:nvCxnSpPr>
+          <p:spPr>
+            <a:xfrm>
+              <a:off x="5122751" y="2571183"/>
+              <a:ext cx="0" cy="1792588"/>
+            </a:xfrm>
+            <a:prstGeom prst="straightConnector1">
+              <a:avLst/>
+            </a:prstGeom>
+            <a:ln>
+              <a:tailEnd type="arrow"/>
+            </a:ln>
+          </p:spPr>
+          <p:style>
+            <a:lnRef idx="2">
+              <a:schemeClr val="dk1"/>
+            </a:lnRef>
+            <a:fillRef idx="0">
+              <a:schemeClr val="dk1"/>
+            </a:fillRef>
+            <a:effectRef idx="1">
+              <a:schemeClr val="dk1"/>
+            </a:effectRef>
+            <a:fontRef idx="minor">
+              <a:schemeClr val="tx1"/>
+            </a:fontRef>
+          </p:style>
+        </p:cxnSp>
+        <p:cxnSp>
+          <p:nvCxnSpPr>
+            <p:cNvPr id="47" name="Straight Arrow Connector 46"/>
+            <p:cNvCxnSpPr>
+              <a:stCxn id="7" idx="2"/>
+              <a:endCxn id="30" idx="0"/>
+            </p:cNvCxnSpPr>
+            <p:nvPr/>
+          </p:nvCxnSpPr>
+          <p:spPr>
+            <a:xfrm>
+              <a:off x="3710411" y="2571183"/>
+              <a:ext cx="0" cy="1792588"/>
+            </a:xfrm>
+            <a:prstGeom prst="straightConnector1">
+              <a:avLst/>
+            </a:prstGeom>
+            <a:ln>
+              <a:tailEnd type="arrow"/>
+            </a:ln>
+          </p:spPr>
+          <p:style>
+            <a:lnRef idx="2">
+              <a:schemeClr val="dk1"/>
+            </a:lnRef>
+            <a:fillRef idx="0">
+              <a:schemeClr val="dk1"/>
+            </a:fillRef>
+            <a:effectRef idx="1">
+              <a:schemeClr val="dk1"/>
+            </a:effectRef>
+            <a:fontRef idx="minor">
+              <a:schemeClr val="tx1"/>
+            </a:fontRef>
+          </p:style>
+        </p:cxnSp>
+        <p:cxnSp>
+          <p:nvCxnSpPr>
+            <p:cNvPr id="54" name="Straight Arrow Connector 53"/>
+            <p:cNvCxnSpPr>
+              <a:stCxn id="6" idx="2"/>
+              <a:endCxn id="33" idx="0"/>
+            </p:cNvCxnSpPr>
+            <p:nvPr/>
+          </p:nvCxnSpPr>
+          <p:spPr>
+            <a:xfrm>
+              <a:off x="7947431" y="2571183"/>
+              <a:ext cx="0" cy="1792588"/>
+            </a:xfrm>
+            <a:prstGeom prst="straightConnector1">
+              <a:avLst/>
+            </a:prstGeom>
+            <a:ln>
+              <a:tailEnd type="arrow"/>
+            </a:ln>
+          </p:spPr>
+          <p:style>
+            <a:lnRef idx="2">
+              <a:schemeClr val="dk1"/>
+            </a:lnRef>
+            <a:fillRef idx="0">
+              <a:schemeClr val="dk1"/>
+            </a:fillRef>
+            <a:effectRef idx="1">
+              <a:schemeClr val="dk1"/>
+            </a:effectRef>
+            <a:fontRef idx="minor">
+              <a:schemeClr val="tx1"/>
+            </a:fontRef>
+          </p:style>
+        </p:cxnSp>
+        <p:cxnSp>
+          <p:nvCxnSpPr>
+            <p:cNvPr id="59" name="Straight Connector 58"/>
+            <p:cNvCxnSpPr/>
+            <p:nvPr/>
+          </p:nvCxnSpPr>
+          <p:spPr>
+            <a:xfrm>
+              <a:off x="457200" y="3322622"/>
+              <a:ext cx="8007790" cy="0"/>
+            </a:xfrm>
+            <a:prstGeom prst="line">
+              <a:avLst/>
+            </a:prstGeom>
+          </p:spPr>
+          <p:style>
+            <a:lnRef idx="3">
+              <a:schemeClr val="accent5"/>
+            </a:lnRef>
+            <a:fillRef idx="0">
+              <a:schemeClr val="accent5"/>
+            </a:fillRef>
+            <a:effectRef idx="2">
+              <a:schemeClr val="accent5"/>
+            </a:effectRef>
+            <a:fontRef idx="minor">
+              <a:schemeClr val="tx1"/>
+            </a:fontRef>
+          </p:style>
+        </p:cxnSp>
+        <p:sp>
+          <p:nvSpPr>
+            <p:cNvPr id="61" name="TextBox 60"/>
+            <p:cNvSpPr txBox="1"/>
+            <p:nvPr/>
+          </p:nvSpPr>
+          <p:spPr>
+            <a:xfrm>
+              <a:off x="457200" y="1812554"/>
+              <a:ext cx="1818126" cy="369332"/>
+            </a:xfrm>
+            <a:prstGeom prst="rect">
+              <a:avLst/>
+            </a:prstGeom>
+            <a:noFill/>
+          </p:spPr>
+          <p:txBody>
+            <a:bodyPr wrap="none" rtlCol="0">
+              <a:spAutoFit/>
+            </a:bodyPr>
+            <a:lstStyle/>
+            <a:p>
+              <a:r>
+                <a:rPr lang="en-US" dirty="0" smtClean="0"/>
+                <a:t>Markov Process</a:t>
+              </a:r>
+              <a:endParaRPr lang="en-US" dirty="0"/>
+            </a:p>
+          </p:txBody>
+        </p:sp>
+        <p:sp>
+          <p:nvSpPr>
+            <p:cNvPr id="62" name="TextBox 61"/>
+            <p:cNvSpPr txBox="1"/>
+            <p:nvPr/>
+          </p:nvSpPr>
+          <p:spPr>
+            <a:xfrm>
+              <a:off x="532646" y="4803791"/>
+              <a:ext cx="1534587" cy="369332"/>
+            </a:xfrm>
+            <a:prstGeom prst="rect">
+              <a:avLst/>
+            </a:prstGeom>
+            <a:noFill/>
+          </p:spPr>
+          <p:txBody>
+            <a:bodyPr wrap="none" rtlCol="0">
+              <a:spAutoFit/>
+            </a:bodyPr>
+            <a:lstStyle/>
+            <a:p>
+              <a:r>
+                <a:rPr lang="en-US" dirty="0" smtClean="0"/>
+                <a:t>Observations</a:t>
+              </a:r>
+              <a:endParaRPr lang="en-US" dirty="0"/>
+            </a:p>
+          </p:txBody>
+        </p:sp>
+        <p:sp>
+          <p:nvSpPr>
+            <p:cNvPr id="63" name="TextBox 62"/>
+            <p:cNvSpPr txBox="1"/>
+            <p:nvPr/>
+          </p:nvSpPr>
+          <p:spPr>
+            <a:xfrm>
+              <a:off x="1394234" y="2453485"/>
+              <a:ext cx="441146" cy="369332"/>
+            </a:xfrm>
+            <a:prstGeom prst="rect">
+              <a:avLst/>
+            </a:prstGeom>
+            <a:noFill/>
+          </p:spPr>
+          <p:txBody>
+            <a:bodyPr wrap="none" rtlCol="0">
+              <a:spAutoFit/>
+            </a:bodyPr>
+            <a:lstStyle/>
+            <a:p>
+              <a:r>
+                <a:rPr lang="en-US" dirty="0" smtClean="0"/>
+                <a:t>A</a:t>
+              </a:r>
+              <a:r>
+                <a:rPr lang="en-US" baseline="-25000" dirty="0" smtClean="0"/>
+                <a:t>1</a:t>
+              </a:r>
+              <a:endParaRPr lang="en-US" dirty="0"/>
+            </a:p>
+          </p:txBody>
+        </p:sp>
+        <p:sp>
+          <p:nvSpPr>
+            <p:cNvPr id="64" name="TextBox 63"/>
+            <p:cNvSpPr txBox="1"/>
+            <p:nvPr/>
+          </p:nvSpPr>
+          <p:spPr>
+            <a:xfrm>
+              <a:off x="2788468" y="2453485"/>
+              <a:ext cx="441146" cy="369332"/>
+            </a:xfrm>
+            <a:prstGeom prst="rect">
+              <a:avLst/>
+            </a:prstGeom>
+            <a:noFill/>
+          </p:spPr>
+          <p:txBody>
+            <a:bodyPr wrap="none" rtlCol="0">
+              <a:spAutoFit/>
+            </a:bodyPr>
+            <a:lstStyle/>
+            <a:p>
+              <a:r>
+                <a:rPr lang="en-US" dirty="0" smtClean="0"/>
+                <a:t>A</a:t>
+              </a:r>
+              <a:r>
+                <a:rPr lang="en-US" baseline="-25000" dirty="0" smtClean="0"/>
+                <a:t>2</a:t>
+              </a:r>
+              <a:endParaRPr lang="en-US" dirty="0"/>
+            </a:p>
+          </p:txBody>
+        </p:sp>
+        <p:sp>
+          <p:nvSpPr>
+            <p:cNvPr id="65" name="TextBox 64"/>
+            <p:cNvSpPr txBox="1"/>
+            <p:nvPr/>
+          </p:nvSpPr>
+          <p:spPr>
+            <a:xfrm>
+              <a:off x="7000803" y="2453485"/>
+              <a:ext cx="441146" cy="369332"/>
+            </a:xfrm>
+            <a:prstGeom prst="rect">
+              <a:avLst/>
+            </a:prstGeom>
+            <a:noFill/>
+          </p:spPr>
+          <p:txBody>
+            <a:bodyPr wrap="none" rtlCol="0">
+              <a:spAutoFit/>
+            </a:bodyPr>
+            <a:lstStyle/>
+            <a:p>
+              <a:r>
+                <a:rPr lang="en-US" dirty="0" smtClean="0"/>
+                <a:t>A</a:t>
+              </a:r>
+              <a:r>
+                <a:rPr lang="en-US" baseline="-25000" dirty="0" smtClean="0"/>
+                <a:t>5</a:t>
+              </a:r>
+              <a:endParaRPr lang="en-US" dirty="0"/>
+            </a:p>
+          </p:txBody>
+        </p:sp>
+        <p:sp>
+          <p:nvSpPr>
+            <p:cNvPr id="66" name="TextBox 65"/>
+            <p:cNvSpPr txBox="1"/>
+            <p:nvPr/>
+          </p:nvSpPr>
+          <p:spPr>
+            <a:xfrm>
+              <a:off x="5597515" y="2453485"/>
+              <a:ext cx="441146" cy="369332"/>
+            </a:xfrm>
+            <a:prstGeom prst="rect">
+              <a:avLst/>
+            </a:prstGeom>
+            <a:noFill/>
+          </p:spPr>
+          <p:txBody>
+            <a:bodyPr wrap="none" rtlCol="0">
+              <a:spAutoFit/>
+            </a:bodyPr>
+            <a:lstStyle/>
+            <a:p>
+              <a:r>
+                <a:rPr lang="en-US" dirty="0" smtClean="0"/>
+                <a:t>A</a:t>
+              </a:r>
+              <a:r>
+                <a:rPr lang="en-US" baseline="-25000" dirty="0" smtClean="0"/>
+                <a:t>4</a:t>
+              </a:r>
+              <a:endParaRPr lang="en-US" dirty="0"/>
+            </a:p>
+          </p:txBody>
+        </p:sp>
+        <p:sp>
+          <p:nvSpPr>
+            <p:cNvPr id="67" name="TextBox 66"/>
+            <p:cNvSpPr txBox="1"/>
+            <p:nvPr/>
+          </p:nvSpPr>
+          <p:spPr>
+            <a:xfrm>
+              <a:off x="4210831" y="2453485"/>
+              <a:ext cx="441146" cy="369332"/>
+            </a:xfrm>
+            <a:prstGeom prst="rect">
+              <a:avLst/>
+            </a:prstGeom>
+            <a:noFill/>
+          </p:spPr>
+          <p:txBody>
+            <a:bodyPr wrap="none" rtlCol="0">
+              <a:spAutoFit/>
+            </a:bodyPr>
+            <a:lstStyle/>
+            <a:p>
+              <a:r>
+                <a:rPr lang="en-US" dirty="0" smtClean="0"/>
+                <a:t>A</a:t>
+              </a:r>
+              <a:r>
+                <a:rPr lang="en-US" baseline="-25000" dirty="0" smtClean="0"/>
+                <a:t>3</a:t>
+              </a:r>
+              <a:endParaRPr lang="en-US" dirty="0"/>
+            </a:p>
+          </p:txBody>
+        </p:sp>
+      </p:grpSp>
+    </p:spTree>
+  </p:cSld>
+  <p:clrMapOvr>
+    <a:masterClrMapping/>
+  </p:clrMapOvr>
+</p:sld>
+</file>
+
+<file path=ppt/slides/slide5.xml><?xml version="1.0" encoding="utf-8"?>
+<p:sld xmlns:a="http://schemas.openxmlformats.org/drawingml/2006/main" xmlns:r="http://schemas.openxmlformats.org/officeDocument/2006/relationships" xmlns:p="http://schemas.openxmlformats.org/presentationml/2006/main">
+  <p:cSld>
+    <p:spTree>
+      <p:nvGrpSpPr>
+        <p:cNvPr id="1" name=""/>
+        <p:cNvGrpSpPr/>
+        <p:nvPr/>
+      </p:nvGrpSpPr>
+      <p:grpSpPr>
+        <a:xfrm>
+          <a:off x="0" y="0"/>
+          <a:ext cx="0" cy="0"/>
+          <a:chOff x="0" y="0"/>
+          <a:chExt cx="0" cy="0"/>
+        </a:xfrm>
+      </p:grpSpPr>
+      <p:sp>
+        <p:nvSpPr>
+          <p:cNvPr id="2" name="Title 1"/>
+          <p:cNvSpPr>
+            <a:spLocks noGrp="1"/>
+          </p:cNvSpPr>
+          <p:nvPr>
+            <p:ph type="title"/>
+          </p:nvPr>
+        </p:nvSpPr>
+        <p:spPr/>
+        <p:txBody>
+          <a:bodyPr/>
+          <a:lstStyle/>
+          <a:p>
+            <a:r>
+              <a:rPr lang="en-US" sz="4400" dirty="0" smtClean="0"/>
+              <a:t>Hidden Markov Model (HMM)</a:t>
+            </a:r>
+            <a:endParaRPr lang="en-US" sz="4400" dirty="0"/>
+          </a:p>
+        </p:txBody>
+      </p:sp>
+      <p:sp>
+        <p:nvSpPr>
+          <p:cNvPr id="3" name="Content Placeholder 2"/>
+          <p:cNvSpPr>
+            <a:spLocks noGrp="1"/>
+          </p:cNvSpPr>
+          <p:nvPr>
+            <p:ph idx="1"/>
+          </p:nvPr>
+        </p:nvSpPr>
+        <p:spPr/>
+        <p:txBody>
+          <a:bodyPr/>
+          <a:lstStyle/>
+          <a:p>
+            <a:r>
+              <a:rPr lang="en-US" dirty="0" smtClean="0"/>
+              <a:t>Observations are words inputted by the user</a:t>
+            </a:r>
+          </a:p>
+          <a:p>
+            <a:r>
+              <a:rPr lang="en-US" dirty="0" smtClean="0"/>
+              <a:t>Each observation(O</a:t>
+            </a:r>
+            <a:r>
+              <a:rPr lang="en-US" baseline="-25000" dirty="0" smtClean="0"/>
+              <a:t>1</a:t>
+            </a:r>
+            <a:r>
+              <a:rPr lang="en-US" baseline="-25000" dirty="0" smtClean="0"/>
+              <a:t>,</a:t>
+            </a:r>
+            <a:r>
+              <a:rPr lang="en-US" dirty="0" smtClean="0"/>
+              <a:t> O</a:t>
+            </a:r>
+            <a:r>
+              <a:rPr lang="en-US" baseline="-25000" dirty="0" smtClean="0"/>
+              <a:t>2</a:t>
+            </a:r>
+            <a:r>
+              <a:rPr lang="en-US" dirty="0" smtClean="0"/>
+              <a:t>…) is assumed to be dependent on a state (X</a:t>
+            </a:r>
+            <a:r>
+              <a:rPr lang="en-US" baseline="-25000" dirty="0" smtClean="0"/>
+              <a:t>1,</a:t>
+            </a:r>
+            <a:r>
+              <a:rPr lang="en-US" dirty="0" smtClean="0"/>
+              <a:t> X</a:t>
+            </a:r>
+            <a:r>
+              <a:rPr lang="en-US" baseline="-25000" dirty="0" smtClean="0"/>
+              <a:t>2</a:t>
+            </a:r>
+            <a:r>
+              <a:rPr lang="en-US" dirty="0" smtClean="0"/>
+              <a:t>…).</a:t>
+            </a:r>
+          </a:p>
+          <a:p>
+            <a:r>
+              <a:rPr lang="en-US" dirty="0" smtClean="0"/>
+              <a:t>We cannot see the state (thus it is hidden)</a:t>
+            </a:r>
+          </a:p>
+          <a:p>
+            <a:r>
+              <a:rPr lang="en-US" dirty="0" smtClean="0"/>
+              <a:t>Can guess the states based on the observed words</a:t>
+            </a:r>
+          </a:p>
+          <a:p>
+            <a:r>
+              <a:rPr lang="en-US" dirty="0" smtClean="0"/>
+              <a:t>After each observed word, the state can change (A</a:t>
+            </a:r>
+            <a:r>
+              <a:rPr lang="en-US" baseline="-25000" dirty="0" smtClean="0"/>
+              <a:t>1,</a:t>
+            </a:r>
+            <a:r>
+              <a:rPr lang="en-US" dirty="0" smtClean="0"/>
+              <a:t> A</a:t>
+            </a:r>
+            <a:r>
+              <a:rPr lang="en-US" baseline="-25000" dirty="0" smtClean="0"/>
+              <a:t>2</a:t>
+            </a:r>
+            <a:r>
+              <a:rPr lang="en-US" dirty="0" smtClean="0"/>
+              <a:t>…)</a:t>
+            </a:r>
+          </a:p>
+          <a:p>
+            <a:r>
+              <a:rPr lang="en-US" dirty="0" smtClean="0"/>
+              <a:t>Probabilities of </a:t>
+            </a:r>
+            <a:r>
+              <a:rPr lang="en-US" dirty="0" smtClean="0"/>
+              <a:t>changing </a:t>
+            </a:r>
+            <a:r>
+              <a:rPr lang="en-US" dirty="0" smtClean="0"/>
+              <a:t>states depends ONLY on current state</a:t>
+            </a:r>
+          </a:p>
+        </p:txBody>
+      </p:sp>
+    </p:spTree>
+  </p:cSld>
+  <p:clrMapOvr>
+    <a:masterClrMapping/>
+  </p:clrMapOvr>
+</p:sld>
+</file>
+
+<file path=ppt/slides/slide6.xml><?xml version="1.0" encoding="utf-8"?>
+<p:sld xmlns:a="http://schemas.openxmlformats.org/drawingml/2006/main" xmlns:r="http://schemas.openxmlformats.org/officeDocument/2006/relationships" xmlns:p="http://schemas.openxmlformats.org/presentationml/2006/main">
+  <p:cSld>
+    <p:spTree>
+      <p:nvGrpSpPr>
+        <p:cNvPr id="1" name=""/>
+        <p:cNvGrpSpPr/>
+        <p:nvPr/>
+      </p:nvGrpSpPr>
+      <p:grpSpPr>
+        <a:xfrm>
+          <a:off x="0" y="0"/>
+          <a:ext cx="0" cy="0"/>
+          <a:chOff x="0" y="0"/>
+          <a:chExt cx="0" cy="0"/>
+        </a:xfrm>
+      </p:grpSpPr>
+      <p:sp>
+        <p:nvSpPr>
+          <p:cNvPr id="2" name="Title 1"/>
+          <p:cNvSpPr>
+            <a:spLocks noGrp="1"/>
+          </p:cNvSpPr>
+          <p:nvPr>
+            <p:ph type="title"/>
+          </p:nvPr>
+        </p:nvSpPr>
+        <p:spPr/>
+        <p:txBody>
+          <a:bodyPr/>
+          <a:lstStyle/>
+          <a:p>
+            <a:r>
+              <a:rPr lang="en-US" sz="4000" dirty="0" smtClean="0"/>
+              <a:t>Part of Speech Tagging and HMM</a:t>
+            </a:r>
+            <a:endParaRPr lang="en-US" sz="4000" dirty="0"/>
+          </a:p>
+        </p:txBody>
+      </p:sp>
+      <p:sp>
+        <p:nvSpPr>
+          <p:cNvPr id="3" name="Content Placeholder 2"/>
+          <p:cNvSpPr>
+            <a:spLocks noGrp="1"/>
+          </p:cNvSpPr>
+          <p:nvPr>
+            <p:ph idx="1"/>
+          </p:nvPr>
+        </p:nvSpPr>
+        <p:spPr/>
+        <p:txBody>
+          <a:bodyPr/>
+          <a:lstStyle/>
+          <a:p>
+            <a:r>
+              <a:rPr lang="en-US" dirty="0" smtClean="0"/>
+              <a:t>Words are observations</a:t>
+            </a:r>
+          </a:p>
+          <a:p>
+            <a:r>
+              <a:rPr lang="en-US" dirty="0" smtClean="0"/>
+              <a:t>Parts of speech are states</a:t>
+            </a:r>
+          </a:p>
+          <a:p>
+            <a:r>
+              <a:rPr lang="en-US" dirty="0" smtClean="0"/>
+              <a:t>Probability of states changing are stored in a dictionary</a:t>
+            </a:r>
+          </a:p>
+          <a:p>
+            <a:pPr lvl="1"/>
+            <a:r>
+              <a:rPr lang="en-US" dirty="0" smtClean="0"/>
+              <a:t>Some combinations such as “article-noun” and “noun-verb” are perhaps more likely to occur than “article-prep” and “prep-adjective”</a:t>
+            </a:r>
+          </a:p>
+          <a:p>
+            <a:r>
+              <a:rPr lang="en-US" dirty="0" smtClean="0"/>
+              <a:t>Calculate probabilities of possible part of speech sequences</a:t>
+            </a:r>
+          </a:p>
+          <a:p>
+            <a:r>
+              <a:rPr lang="en-US" dirty="0" smtClean="0"/>
+              <a:t>Highest probability = part of speech sequence</a:t>
+            </a:r>
+            <a:endParaRPr lang="en-US" dirty="0"/>
+          </a:p>
+        </p:txBody>
+      </p:sp>
+    </p:spTree>
+  </p:cSld>
+  <p:clrMapOvr>
+    <a:masterClrMapping/>
+  </p:clrMapOvr>
+</p:sld>
+</file>
+
+<file path=ppt/slides/slide7.xml><?xml version="1.0" encoding="utf-8"?>
+<p:sld xmlns:a="http://schemas.openxmlformats.org/drawingml/2006/main" xmlns:r="http://schemas.openxmlformats.org/officeDocument/2006/relationships" xmlns:p="http://schemas.openxmlformats.org/presentationml/2006/main">
+  <p:cSld>
+    <p:spTree>
+      <p:nvGrpSpPr>
+        <p:cNvPr id="1" name=""/>
+        <p:cNvGrpSpPr/>
+        <p:nvPr/>
+      </p:nvGrpSpPr>
+      <p:grpSpPr>
+        <a:xfrm>
+          <a:off x="0" y="0"/>
+          <a:ext cx="0" cy="0"/>
+          <a:chOff x="0" y="0"/>
+          <a:chExt cx="0" cy="0"/>
+        </a:xfrm>
+      </p:grpSpPr>
+      <p:sp>
+        <p:nvSpPr>
+          <p:cNvPr id="2" name="Title 1"/>
+          <p:cNvSpPr>
+            <a:spLocks noGrp="1"/>
+          </p:cNvSpPr>
+          <p:nvPr>
+            <p:ph type="title"/>
+          </p:nvPr>
+        </p:nvSpPr>
+        <p:spPr/>
+        <p:txBody>
+          <a:bodyPr/>
+          <a:lstStyle/>
+          <a:p>
+            <a:r>
+              <a:rPr lang="en-US" dirty="0" smtClean="0"/>
+              <a:t>Implementation</a:t>
+            </a:r>
+            <a:endParaRPr lang="en-US" dirty="0"/>
+          </a:p>
+        </p:txBody>
+      </p:sp>
+      <p:sp>
+        <p:nvSpPr>
+          <p:cNvPr id="3" name="Content Placeholder 2"/>
+          <p:cNvSpPr>
+            <a:spLocks noGrp="1"/>
+          </p:cNvSpPr>
+          <p:nvPr>
+            <p:ph idx="1"/>
+          </p:nvPr>
+        </p:nvSpPr>
+        <p:spPr/>
+        <p:txBody>
+          <a:bodyPr/>
+          <a:lstStyle/>
+          <a:p>
+            <a:r>
+              <a:rPr lang="en-US" b="1" dirty="0" smtClean="0"/>
+              <a:t>Brown Corpus Processing</a:t>
+            </a:r>
+            <a:r>
+              <a:rPr lang="en-US" dirty="0" smtClean="0"/>
+              <a:t>: Importing information from the Brown Corpus and creating a dictionary with part of speech combinations and states</a:t>
+            </a:r>
+          </a:p>
+          <a:p>
+            <a:r>
+              <a:rPr lang="en-US" b="1" dirty="0" smtClean="0"/>
+              <a:t>Tokenization:</a:t>
+            </a:r>
+            <a:r>
+              <a:rPr lang="en-US" dirty="0" smtClean="0"/>
+              <a:t> Separating out words so that we can have a series of “observations”</a:t>
+            </a:r>
+          </a:p>
+          <a:p>
+            <a:r>
+              <a:rPr lang="en-US" b="1" dirty="0" smtClean="0"/>
+              <a:t>Iteration:</a:t>
+            </a:r>
+            <a:r>
+              <a:rPr lang="en-US" dirty="0" smtClean="0"/>
+              <a:t> Given series of words, create </a:t>
+            </a:r>
+            <a:endParaRPr lang="en-US" b="1" dirty="0" smtClean="0"/>
+          </a:p>
+          <a:p>
+            <a:endParaRPr lang="en-US" b="1" dirty="0"/>
+          </a:p>
+        </p:txBody>
+      </p:sp>
+    </p:spTree>
+  </p:cSld>
+  <p:clrMapOvr>
+    <a:masterClrMapping/>
+  </p:clrMapOvr>
+</p:sld>
+</file>
+
+<file path=ppt/slides/slide8.xml><?xml version="1.0" encoding="utf-8"?>
+<p:sld xmlns:a="http://schemas.openxmlformats.org/drawingml/2006/main" xmlns:r="http://schemas.openxmlformats.org/officeDocument/2006/relationships" xmlns:p="http://schemas.openxmlformats.org/presentationml/2006/main">
+  <p:cSld>
+    <p:spTree>
+      <p:nvGrpSpPr>
+        <p:cNvPr id="1" name=""/>
+        <p:cNvGrpSpPr/>
+        <p:nvPr/>
+      </p:nvGrpSpPr>
+      <p:grpSpPr>
+        <a:xfrm>
+          <a:off x="0" y="0"/>
+          <a:ext cx="0" cy="0"/>
+          <a:chOff x="0" y="0"/>
+          <a:chExt cx="0" cy="0"/>
+        </a:xfrm>
+      </p:grpSpPr>
+      <p:sp>
+        <p:nvSpPr>
+          <p:cNvPr id="2" name="Title 1"/>
+          <p:cNvSpPr>
+            <a:spLocks noGrp="1"/>
+          </p:cNvSpPr>
+          <p:nvPr>
+            <p:ph type="title"/>
+          </p:nvPr>
+        </p:nvSpPr>
+        <p:spPr/>
+        <p:txBody>
+          <a:bodyPr/>
+          <a:lstStyle/>
+          <a:p>
+            <a:r>
+              <a:rPr lang="en-US" smtClean="0"/>
+              <a:t>Welcome to NerdDoge!</a:t>
+            </a:r>
+            <a:endParaRPr lang="en-US" dirty="0"/>
+          </a:p>
+        </p:txBody>
+      </p:sp>
+      <p:pic>
+        <p:nvPicPr>
+          <p:cNvPr id="1026" name="Picture 2"/>
+          <p:cNvPicPr>
+            <a:picLocks noGrp="1" noChangeAspect="1" noChangeArrowheads="1"/>
+          </p:cNvPicPr>
+          <p:nvPr>
+            <p:ph idx="1"/>
+          </p:nvPr>
+        </p:nvPicPr>
+        <p:blipFill>
+          <a:blip r:embed="rId2" cstate="print"/>
+          <a:srcRect t="3051" b="4534"/>
+          <a:stretch>
+            <a:fillRect/>
+          </a:stretch>
+        </p:blipFill>
+        <p:spPr bwMode="auto">
+          <a:xfrm>
+            <a:off x="548922" y="1738265"/>
+            <a:ext cx="8046156" cy="4182701"/>
+          </a:xfrm>
+          <a:prstGeom prst="rect">
+            <a:avLst/>
+          </a:prstGeom>
+          <a:noFill/>
+          <a:ln w="9525">
+            <a:noFill/>
+            <a:miter lim="800000"/>
+            <a:headEnd/>
+            <a:tailEnd/>
+          </a:ln>
+        </p:spPr>
+      </p:pic>
+      <p:sp>
+        <p:nvSpPr>
+          <p:cNvPr id="16" name="Rounded Rectangle 15"/>
+          <p:cNvSpPr/>
+          <p:nvPr/>
+        </p:nvSpPr>
+        <p:spPr>
+          <a:xfrm>
+            <a:off x="3648547" y="5187636"/>
+            <a:ext cx="669956" cy="153909"/>
+          </a:xfrm>
+          <a:prstGeom prst="roundRect">
+            <a:avLst/>
+          </a:prstGeom>
+          <a:noFill/>
+        </p:spPr>
+        <p:style>
+          <a:lnRef idx="2">
+            <a:schemeClr val="accent1">
+              <a:shade val="50000"/>
+            </a:schemeClr>
+          </a:lnRef>
+          <a:fillRef idx="1">
+            <a:schemeClr val="accent1"/>
+          </a:fillRef>
+          <a:effectRef idx="0">
+            <a:schemeClr val="accent1"/>
+          </a:effectRef>
+          <a:fontRef idx="minor">
+            <a:schemeClr val="lt1"/>
+          </a:fontRef>
+        </p:style>
+        <p:txBody>
+          <a:bodyPr rtlCol="0" anchor="ctr"/>
+          <a:lstStyle/>
+          <a:p>
+            <a:pPr algn="ctr"/>
+            <a:endParaRPr lang="en-US"/>
+          </a:p>
+        </p:txBody>
+      </p:sp>
+    </p:spTree>
+  </p:cSld>
+  <p:clrMapOvr>
+    <a:masterClrMapping/>
+  </p:clrMapOvr>
+  <p:timing>
+    <p:tnLst>
+      <p:par>
+        <p:cTn id="1" dur="indefinite" restart="never" nodeType="tmRoot"/>
+      </p:par>
+    </p:tnLst>
+  </p:timing>
+</p:sld>
+</file>
+
+<file path=ppt/slides/slide9.xml><?xml version="1.0" encoding="utf-8"?>
+<p:sld xmlns:a="http://schemas.openxmlformats.org/drawingml/2006/main" xmlns:r="http://schemas.openxmlformats.org/officeDocument/2006/relationships" xmlns:p="http://schemas.openxmlformats.org/presentationml/2006/main">
+  <p:cSld>
+    <p:spTree>
+      <p:nvGrpSpPr>
+        <p:cNvPr id="1" name=""/>
+        <p:cNvGrpSpPr/>
+        <p:nvPr/>
+      </p:nvGrpSpPr>
+      <p:grpSpPr>
+        <a:xfrm>
+          <a:off x="0" y="0"/>
+          <a:ext cx="0" cy="0"/>
+          <a:chOff x="0" y="0"/>
+          <a:chExt cx="0" cy="0"/>
+        </a:xfrm>
+      </p:grpSpPr>
+      <p:sp>
+        <p:nvSpPr>
+          <p:cNvPr id="2" name="Title 1"/>
+          <p:cNvSpPr>
+            <a:spLocks noGrp="1"/>
+          </p:cNvSpPr>
+          <p:nvPr>
+            <p:ph type="title"/>
+          </p:nvPr>
+        </p:nvSpPr>
+        <p:spPr/>
+        <p:txBody>
+          <a:bodyPr/>
+          <a:lstStyle/>
+          <a:p>
+            <a:r>
+              <a:rPr lang="en-US" dirty="0" smtClean="0"/>
+              <a:t>The </a:t>
+            </a:r>
+            <a:r>
+              <a:rPr lang="en-US" dirty="0" err="1" smtClean="0"/>
+              <a:t>NerdDoge</a:t>
+            </a:r>
+            <a:r>
+              <a:rPr lang="en-US" dirty="0" smtClean="0"/>
+              <a:t> speaks!</a:t>
+            </a:r>
+            <a:endParaRPr lang="en-US" dirty="0"/>
+          </a:p>
+        </p:txBody>
+      </p:sp>
+      <p:pic>
+        <p:nvPicPr>
+          <p:cNvPr id="2052" name="Picture 4"/>
+          <p:cNvPicPr>
+            <a:picLocks noGrp="1" noChangeAspect="1" noChangeArrowheads="1"/>
+          </p:cNvPicPr>
+          <p:nvPr>
+            <p:ph idx="1"/>
+          </p:nvPr>
+        </p:nvPicPr>
+        <p:blipFill>
+          <a:blip r:embed="rId2" cstate="print"/>
+          <a:srcRect t="3251" b="4725"/>
+          <a:stretch>
+            <a:fillRect/>
+          </a:stretch>
+        </p:blipFill>
+        <p:spPr bwMode="auto">
+          <a:xfrm>
+            <a:off x="549275" y="1747319"/>
+            <a:ext cx="8045450" cy="4164594"/>
+          </a:xfrm>
+          <a:prstGeom prst="rect">
+            <a:avLst/>
+          </a:prstGeom>
+          <a:noFill/>
+          <a:ln w="9525">
+            <a:noFill/>
+            <a:miter lim="800000"/>
+            <a:headEnd/>
+            <a:tailEnd/>
+          </a:ln>
+        </p:spPr>
+      </p:pic>
+      <p:sp>
+        <p:nvSpPr>
+          <p:cNvPr id="8" name="Rounded Rectangle 7"/>
+          <p:cNvSpPr/>
+          <p:nvPr/>
+        </p:nvSpPr>
+        <p:spPr>
+          <a:xfrm>
+            <a:off x="2381061" y="4798337"/>
+            <a:ext cx="3032911" cy="380245"/>
+          </a:xfrm>
+          <a:prstGeom prst="roundRect">
+            <a:avLst/>
+          </a:prstGeom>
+          <a:noFill/>
+        </p:spPr>
+        <p:style>
+          <a:lnRef idx="2">
+            <a:schemeClr val="accent1">
+              <a:shade val="50000"/>
+            </a:schemeClr>
+          </a:lnRef>
+          <a:fillRef idx="1">
+            <a:schemeClr val="accent1"/>
+          </a:fillRef>
+          <a:effectRef idx="0">
+            <a:schemeClr val="accent1"/>
+          </a:effectRef>
+          <a:fontRef idx="minor">
+            <a:schemeClr val="lt1"/>
+          </a:fontRef>
+        </p:style>
+        <p:txBody>
+          <a:bodyPr rtlCol="0" anchor="ctr"/>
+          <a:lstStyle/>
+          <a:p>
+            <a:pPr algn="ctr"/>
+            <a:endParaRPr lang="en-US"/>
+          </a:p>
+        </p:txBody>
+      </p:sp>
+    </p:spTree>
+  </p:cSld>
+  <p:clrMapOvr>
+    <a:masterClrMapping/>
+  </p:clrMapOvr>
+  <p:timing>
+    <p:tnLst>
+      <p:par>
+        <p:cTn id="1" dur="indefinite" restart="never" nodeType="tmRoot"/>
+      </p:par>
+    </p:tnLst>
+  </p:timing>
 </p:sld>
 </file>
 

</xml_diff>